<commit_message>
packet is going through the path. need more testing
</commit_message>
<xml_diff>
--- a/doc/plan.pptx
+++ b/doc/plan.pptx
@@ -272,7 +272,7 @@
           <a:p>
             <a:fld id="{2EE5EF10-3D11-419F-A8C1-99878D53651A}" type="datetimeFigureOut">
               <a:rPr lang="en-US" smtClean="0"/>
-              <a:t>2/21/2021</a:t>
+              <a:t>2/22/2021</a:t>
             </a:fld>
             <a:endParaRPr lang="en-US"/>
           </a:p>
@@ -470,7 +470,7 @@
           <a:p>
             <a:fld id="{2EE5EF10-3D11-419F-A8C1-99878D53651A}" type="datetimeFigureOut">
               <a:rPr lang="en-US" smtClean="0"/>
-              <a:t>2/21/2021</a:t>
+              <a:t>2/22/2021</a:t>
             </a:fld>
             <a:endParaRPr lang="en-US"/>
           </a:p>
@@ -678,7 +678,7 @@
           <a:p>
             <a:fld id="{2EE5EF10-3D11-419F-A8C1-99878D53651A}" type="datetimeFigureOut">
               <a:rPr lang="en-US" smtClean="0"/>
-              <a:t>2/21/2021</a:t>
+              <a:t>2/22/2021</a:t>
             </a:fld>
             <a:endParaRPr lang="en-US"/>
           </a:p>
@@ -876,7 +876,7 @@
           <a:p>
             <a:fld id="{2EE5EF10-3D11-419F-A8C1-99878D53651A}" type="datetimeFigureOut">
               <a:rPr lang="en-US" smtClean="0"/>
-              <a:t>2/21/2021</a:t>
+              <a:t>2/22/2021</a:t>
             </a:fld>
             <a:endParaRPr lang="en-US"/>
           </a:p>
@@ -1151,7 +1151,7 @@
           <a:p>
             <a:fld id="{2EE5EF10-3D11-419F-A8C1-99878D53651A}" type="datetimeFigureOut">
               <a:rPr lang="en-US" smtClean="0"/>
-              <a:t>2/21/2021</a:t>
+              <a:t>2/22/2021</a:t>
             </a:fld>
             <a:endParaRPr lang="en-US"/>
           </a:p>
@@ -1416,7 +1416,7 @@
           <a:p>
             <a:fld id="{2EE5EF10-3D11-419F-A8C1-99878D53651A}" type="datetimeFigureOut">
               <a:rPr lang="en-US" smtClean="0"/>
-              <a:t>2/21/2021</a:t>
+              <a:t>2/22/2021</a:t>
             </a:fld>
             <a:endParaRPr lang="en-US"/>
           </a:p>
@@ -1828,7 +1828,7 @@
           <a:p>
             <a:fld id="{2EE5EF10-3D11-419F-A8C1-99878D53651A}" type="datetimeFigureOut">
               <a:rPr lang="en-US" smtClean="0"/>
-              <a:t>2/21/2021</a:t>
+              <a:t>2/22/2021</a:t>
             </a:fld>
             <a:endParaRPr lang="en-US"/>
           </a:p>
@@ -1969,7 +1969,7 @@
           <a:p>
             <a:fld id="{2EE5EF10-3D11-419F-A8C1-99878D53651A}" type="datetimeFigureOut">
               <a:rPr lang="en-US" smtClean="0"/>
-              <a:t>2/21/2021</a:t>
+              <a:t>2/22/2021</a:t>
             </a:fld>
             <a:endParaRPr lang="en-US"/>
           </a:p>
@@ -2082,7 +2082,7 @@
           <a:p>
             <a:fld id="{2EE5EF10-3D11-419F-A8C1-99878D53651A}" type="datetimeFigureOut">
               <a:rPr lang="en-US" smtClean="0"/>
-              <a:t>2/21/2021</a:t>
+              <a:t>2/22/2021</a:t>
             </a:fld>
             <a:endParaRPr lang="en-US"/>
           </a:p>
@@ -2393,7 +2393,7 @@
           <a:p>
             <a:fld id="{2EE5EF10-3D11-419F-A8C1-99878D53651A}" type="datetimeFigureOut">
               <a:rPr lang="en-US" smtClean="0"/>
-              <a:t>2/21/2021</a:t>
+              <a:t>2/22/2021</a:t>
             </a:fld>
             <a:endParaRPr lang="en-US"/>
           </a:p>
@@ -2681,7 +2681,7 @@
           <a:p>
             <a:fld id="{2EE5EF10-3D11-419F-A8C1-99878D53651A}" type="datetimeFigureOut">
               <a:rPr lang="en-US" smtClean="0"/>
-              <a:t>2/21/2021</a:t>
+              <a:t>2/22/2021</a:t>
             </a:fld>
             <a:endParaRPr lang="en-US"/>
           </a:p>
@@ -2922,7 +2922,7 @@
           <a:p>
             <a:fld id="{2EE5EF10-3D11-419F-A8C1-99878D53651A}" type="datetimeFigureOut">
               <a:rPr lang="en-US" smtClean="0"/>
-              <a:t>2/21/2021</a:t>
+              <a:t>2/22/2021</a:t>
             </a:fld>
             <a:endParaRPr lang="en-US"/>
           </a:p>
@@ -5128,7 +5128,9 @@
         </p:nvSpPr>
         <p:spPr/>
         <p:txBody>
-          <a:bodyPr/>
+          <a:bodyPr>
+            <a:normAutofit lnSpcReduction="10000"/>
+          </a:bodyPr>
           <a:lstStyle/>
           <a:p>
             <a:r>
@@ -5139,11 +5141,17 @@
           <a:p>
             <a:r>
               <a:rPr lang="en-US" dirty="0"/>
-              <a:t>When a node receives some data, the delivery rate, the channel, and the queue all together works. First, the data is push to the queue, then delivery rate decides packets it can process. Next, for each outgoing packet, it removes the packet from the queue, adds a delay to the packet and schedules delivery to the next node (found from the path), and puts into </a:t>
+              <a:t>When a node receives some data, the delivery rate, the channel, and the queue all together works. First, the data is push to the queue, then delivery rate decides packets it can process. Next, for each outgoing packet, it removes the packet from the queue, adds a delay to the packet and schedules delivery to the next node (found from the path), and puts into the channel/pipe.</a:t>
+            </a:r>
+          </a:p>
+          <a:p>
+            <a:r>
+              <a:rPr lang="en-US" dirty="0"/>
+              <a:t>Path has a client, and nodes. The last node acts as the server. Server has no running thread. When it receives packets, it </a:t>
             </a:r>
             <a:r>
               <a:rPr lang="en-US"/>
-              <a:t>the channel/pipe.</a:t>
+              <a:t>immediately acknowledges the packets.</a:t>
             </a:r>
             <a:endParaRPr lang="en-US" dirty="0"/>
           </a:p>

</xml_diff>

<commit_message>
routing working. updated doc
</commit_message>
<xml_diff>
--- a/doc/plan.pptx
+++ b/doc/plan.pptx
@@ -19,6 +19,7 @@
     <p:sldId id="267" r:id="rId13"/>
     <p:sldId id="268" r:id="rId14"/>
     <p:sldId id="269" r:id="rId15"/>
+    <p:sldId id="270" r:id="rId16"/>
   </p:sldIdLst>
   <p:sldSz cx="12192000" cy="6858000"/>
   <p:notesSz cx="6858000" cy="9144000"/>
@@ -5147,13 +5148,8 @@
           <a:p>
             <a:r>
               <a:rPr lang="en-US" dirty="0"/>
-              <a:t>Path has a client, and nodes. The last node acts as the server. Server has no running thread. When it receives packets, it </a:t>
-            </a:r>
-            <a:r>
-              <a:rPr lang="en-US"/>
-              <a:t>immediately acknowledges the packets.</a:t>
-            </a:r>
-            <a:endParaRPr lang="en-US" dirty="0"/>
+              <a:t>Path has a client, and nodes. The last node acts as the server. Server has no running thread. When it receives packets, it immediately acknowledges the packets.</a:t>
+            </a:r>
           </a:p>
         </p:txBody>
       </p:sp>
@@ -5210,7 +5206,7 @@
           <a:p>
             <a:r>
               <a:rPr lang="en-US" dirty="0"/>
-              <a:t>Simulation </a:t>
+              <a:t>Uncontrolled Simulation </a:t>
             </a:r>
           </a:p>
         </p:txBody>
@@ -5233,8 +5229,16 @@
         </p:nvSpPr>
         <p:spPr/>
         <p:txBody>
-          <a:bodyPr/>
+          <a:bodyPr>
+            <a:normAutofit lnSpcReduction="10000"/>
+          </a:bodyPr>
           <a:lstStyle/>
+          <a:p>
+            <a:r>
+              <a:rPr lang="en-US" dirty="0"/>
+              <a:t>Each node, client, and server has their own threads and runs asynchronously. </a:t>
+            </a:r>
+          </a:p>
           <a:p>
             <a:r>
               <a:rPr lang="en-US" dirty="0"/>
@@ -5359,7 +5363,10 @@
           <a:bodyPr/>
           <a:lstStyle/>
           <a:p>
-            <a:endParaRPr lang="en-US"/>
+            <a:r>
+              <a:rPr lang="en-US" dirty="0"/>
+              <a:t>Controlled Simulation</a:t>
+            </a:r>
           </a:p>
         </p:txBody>
       </p:sp>
@@ -5384,7 +5391,10 @@
           <a:bodyPr/>
           <a:lstStyle/>
           <a:p>
-            <a:endParaRPr lang="en-US"/>
+            <a:r>
+              <a:rPr lang="en-US" dirty="0"/>
+              <a:t>Simulation algorithm ensures all the nodes, clients and server runs based on synchronized time-steps. All the calculations for a timestep must be completed before the next timestep begins.</a:t>
+            </a:r>
           </a:p>
         </p:txBody>
       </p:sp>
@@ -5392,6 +5402,614 @@
     <p:extLst>
       <p:ext uri="{BB962C8B-B14F-4D97-AF65-F5344CB8AC3E}">
         <p14:creationId xmlns:p14="http://schemas.microsoft.com/office/powerpoint/2010/main" val="2556314694"/>
+      </p:ext>
+    </p:extLst>
+  </p:cSld>
+  <p:clrMapOvr>
+    <a:masterClrMapping/>
+  </p:clrMapOvr>
+</p:sld>
+</file>
+
+<file path=ppt/slides/slide15.xml><?xml version="1.0" encoding="utf-8"?>
+<p:sld xmlns:a="http://schemas.openxmlformats.org/drawingml/2006/main" xmlns:r="http://schemas.openxmlformats.org/officeDocument/2006/relationships" xmlns:p="http://schemas.openxmlformats.org/presentationml/2006/main">
+  <p:cSld>
+    <p:spTree>
+      <p:nvGrpSpPr>
+        <p:cNvPr id="1" name=""/>
+        <p:cNvGrpSpPr/>
+        <p:nvPr/>
+      </p:nvGrpSpPr>
+      <p:grpSpPr>
+        <a:xfrm>
+          <a:off x="0" y="0"/>
+          <a:ext cx="0" cy="0"/>
+          <a:chOff x="0" y="0"/>
+          <a:chExt cx="0" cy="0"/>
+        </a:xfrm>
+      </p:grpSpPr>
+      <p:sp>
+        <p:nvSpPr>
+          <p:cNvPr id="2" name="Title 1">
+            <a:extLst>
+              <a:ext uri="{FF2B5EF4-FFF2-40B4-BE49-F238E27FC236}">
+                <a16:creationId xmlns:a16="http://schemas.microsoft.com/office/drawing/2014/main" id="{D654DDFE-8797-4BF9-94BB-67E7381177A9}"/>
+              </a:ext>
+            </a:extLst>
+          </p:cNvPr>
+          <p:cNvSpPr>
+            <a:spLocks noGrp="1"/>
+          </p:cNvSpPr>
+          <p:nvPr>
+            <p:ph type="title"/>
+          </p:nvPr>
+        </p:nvSpPr>
+        <p:spPr/>
+        <p:txBody>
+          <a:bodyPr/>
+          <a:lstStyle/>
+          <a:p>
+            <a:r>
+              <a:rPr lang="en-US" dirty="0"/>
+              <a:t>Delivery mechanism</a:t>
+            </a:r>
+          </a:p>
+        </p:txBody>
+      </p:sp>
+      <p:sp>
+        <p:nvSpPr>
+          <p:cNvPr id="3" name="Content Placeholder 2">
+            <a:extLst>
+              <a:ext uri="{FF2B5EF4-FFF2-40B4-BE49-F238E27FC236}">
+                <a16:creationId xmlns:a16="http://schemas.microsoft.com/office/drawing/2014/main" id="{A7DE9BE2-E908-4A2A-8B30-BF0121953300}"/>
+              </a:ext>
+            </a:extLst>
+          </p:cNvPr>
+          <p:cNvSpPr>
+            <a:spLocks noGrp="1"/>
+          </p:cNvSpPr>
+          <p:nvPr>
+            <p:ph idx="1"/>
+          </p:nvPr>
+        </p:nvSpPr>
+        <p:spPr>
+          <a:xfrm>
+            <a:off x="838200" y="1825625"/>
+            <a:ext cx="5962095" cy="4351338"/>
+          </a:xfrm>
+        </p:spPr>
+        <p:txBody>
+          <a:bodyPr>
+            <a:normAutofit/>
+          </a:bodyPr>
+          <a:lstStyle/>
+          <a:p>
+            <a:r>
+              <a:rPr lang="en-US" sz="1400" dirty="0"/>
+              <a:t>A previous node calls </a:t>
+            </a:r>
+            <a:r>
+              <a:rPr lang="en-US" sz="1400" dirty="0" err="1"/>
+              <a:t>onIncomingPacket</a:t>
+            </a:r>
+            <a:r>
+              <a:rPr lang="en-US" sz="1400" dirty="0"/>
+              <a:t> of the next node to deliver the packet.</a:t>
+            </a:r>
+          </a:p>
+          <a:p>
+            <a:r>
+              <a:rPr lang="en-US" sz="1400" dirty="0"/>
+              <a:t>When a packet arrives at a node:</a:t>
+            </a:r>
+          </a:p>
+          <a:p>
+            <a:pPr lvl="1"/>
+            <a:r>
+              <a:rPr lang="en-US" sz="1400" dirty="0"/>
+              <a:t>It joins the queue</a:t>
+            </a:r>
+          </a:p>
+          <a:p>
+            <a:pPr lvl="1"/>
+            <a:r>
+              <a:rPr lang="en-US" sz="1400" dirty="0"/>
+              <a:t>Packets </a:t>
+            </a:r>
+            <a:r>
+              <a:rPr lang="en-US" sz="1400" dirty="0" err="1"/>
+              <a:t>curNode</a:t>
+            </a:r>
+            <a:r>
+              <a:rPr lang="en-US" sz="1400" dirty="0"/>
+              <a:t> and </a:t>
+            </a:r>
+            <a:r>
+              <a:rPr lang="en-US" sz="1400" dirty="0" err="1"/>
+              <a:t>nextNode</a:t>
+            </a:r>
+            <a:r>
+              <a:rPr lang="en-US" sz="1400" dirty="0"/>
+              <a:t> (using the path object) is updated</a:t>
+            </a:r>
+          </a:p>
+          <a:p>
+            <a:pPr lvl="1"/>
+            <a:r>
+              <a:rPr lang="en-US" sz="1400" dirty="0"/>
+              <a:t>Does nothing else.</a:t>
+            </a:r>
+          </a:p>
+          <a:p>
+            <a:pPr lvl="1"/>
+            <a:endParaRPr lang="en-US" sz="1400" dirty="0"/>
+          </a:p>
+          <a:p>
+            <a:r>
+              <a:rPr lang="en-US" sz="1400" dirty="0"/>
+              <a:t>On each simulation step:</a:t>
+            </a:r>
+          </a:p>
+          <a:p>
+            <a:pPr lvl="1"/>
+            <a:r>
+              <a:rPr lang="en-US" sz="1400" dirty="0"/>
+              <a:t>Put some packets from the queue to the pipe constraint by the delivery rate of the node.</a:t>
+            </a:r>
+          </a:p>
+          <a:p>
+            <a:pPr lvl="1"/>
+            <a:r>
+              <a:rPr lang="en-US" sz="1400" dirty="0"/>
+              <a:t>When a packet joins the pipe, its </a:t>
+            </a:r>
+            <a:r>
+              <a:rPr lang="en-US" sz="1400" dirty="0" err="1"/>
+              <a:t>nodeLeaveAt</a:t>
+            </a:r>
+            <a:r>
+              <a:rPr lang="en-US" sz="1400" dirty="0"/>
+              <a:t> is updated by the current timestep and delay of the transmission between </a:t>
+            </a:r>
+            <a:r>
+              <a:rPr lang="en-US" sz="1400" dirty="0" err="1"/>
+              <a:t>currentNode</a:t>
+            </a:r>
+            <a:r>
+              <a:rPr lang="en-US" sz="1400" dirty="0"/>
+              <a:t> and </a:t>
+            </a:r>
+            <a:r>
+              <a:rPr lang="en-US" sz="1400" dirty="0" err="1"/>
+              <a:t>destinationNode</a:t>
+            </a:r>
+            <a:r>
+              <a:rPr lang="en-US" sz="1400" dirty="0"/>
+              <a:t>.</a:t>
+            </a:r>
+          </a:p>
+          <a:p>
+            <a:pPr lvl="1"/>
+            <a:r>
+              <a:rPr lang="en-US" sz="1400" dirty="0"/>
+              <a:t>Remove packets from pipe, which have </a:t>
+            </a:r>
+            <a:r>
+              <a:rPr lang="en-US" sz="1400" dirty="0" err="1"/>
+              <a:t>nodeLeaveAt</a:t>
+            </a:r>
+            <a:r>
+              <a:rPr lang="en-US" sz="1400" dirty="0"/>
+              <a:t> is &lt;= timestep, and send to destination nodes </a:t>
+            </a:r>
+          </a:p>
+          <a:p>
+            <a:pPr lvl="1"/>
+            <a:endParaRPr lang="en-US" sz="1400" dirty="0"/>
+          </a:p>
+        </p:txBody>
+      </p:sp>
+      <p:grpSp>
+        <p:nvGrpSpPr>
+          <p:cNvPr id="4" name="Group 3">
+            <a:extLst>
+              <a:ext uri="{FF2B5EF4-FFF2-40B4-BE49-F238E27FC236}">
+                <a16:creationId xmlns:a16="http://schemas.microsoft.com/office/drawing/2014/main" id="{D65B9C6E-E39C-431E-B86E-3C6307DA93D3}"/>
+              </a:ext>
+            </a:extLst>
+          </p:cNvPr>
+          <p:cNvGrpSpPr/>
+          <p:nvPr/>
+        </p:nvGrpSpPr>
+        <p:grpSpPr>
+          <a:xfrm>
+            <a:off x="8955069" y="1825625"/>
+            <a:ext cx="1567543" cy="518300"/>
+            <a:chOff x="5874072" y="1759973"/>
+            <a:chExt cx="1567543" cy="518300"/>
+          </a:xfrm>
+        </p:grpSpPr>
+        <p:sp>
+          <p:nvSpPr>
+            <p:cNvPr id="5" name="Rectangle 4">
+              <a:extLst>
+                <a:ext uri="{FF2B5EF4-FFF2-40B4-BE49-F238E27FC236}">
+                  <a16:creationId xmlns:a16="http://schemas.microsoft.com/office/drawing/2014/main" id="{24D7D4A2-4C77-4E96-B529-0E8B7A993F8D}"/>
+                </a:ext>
+              </a:extLst>
+            </p:cNvPr>
+            <p:cNvSpPr/>
+            <p:nvPr/>
+          </p:nvSpPr>
+          <p:spPr>
+            <a:xfrm>
+              <a:off x="5928852" y="1835821"/>
+              <a:ext cx="210691" cy="366603"/>
+            </a:xfrm>
+            <a:prstGeom prst="rect">
+              <a:avLst/>
+            </a:prstGeom>
+          </p:spPr>
+          <p:style>
+            <a:lnRef idx="2">
+              <a:schemeClr val="accent5"/>
+            </a:lnRef>
+            <a:fillRef idx="1">
+              <a:schemeClr val="lt1"/>
+            </a:fillRef>
+            <a:effectRef idx="0">
+              <a:schemeClr val="accent5"/>
+            </a:effectRef>
+            <a:fontRef idx="minor">
+              <a:schemeClr val="dk1"/>
+            </a:fontRef>
+          </p:style>
+          <p:txBody>
+            <a:bodyPr rtlCol="0" anchor="ctr"/>
+            <a:lstStyle/>
+            <a:p>
+              <a:pPr algn="ctr"/>
+              <a:endParaRPr lang="en-US"/>
+            </a:p>
+          </p:txBody>
+        </p:sp>
+        <p:sp>
+          <p:nvSpPr>
+            <p:cNvPr id="6" name="Rectangle 5">
+              <a:extLst>
+                <a:ext uri="{FF2B5EF4-FFF2-40B4-BE49-F238E27FC236}">
+                  <a16:creationId xmlns:a16="http://schemas.microsoft.com/office/drawing/2014/main" id="{5852EA1D-8E25-4E7D-8B15-015B3F4D3B3B}"/>
+                </a:ext>
+              </a:extLst>
+            </p:cNvPr>
+            <p:cNvSpPr/>
+            <p:nvPr/>
+          </p:nvSpPr>
+          <p:spPr>
+            <a:xfrm>
+              <a:off x="6182384" y="1835821"/>
+              <a:ext cx="210691" cy="366603"/>
+            </a:xfrm>
+            <a:prstGeom prst="rect">
+              <a:avLst/>
+            </a:prstGeom>
+          </p:spPr>
+          <p:style>
+            <a:lnRef idx="2">
+              <a:schemeClr val="accent5"/>
+            </a:lnRef>
+            <a:fillRef idx="1">
+              <a:schemeClr val="lt1"/>
+            </a:fillRef>
+            <a:effectRef idx="0">
+              <a:schemeClr val="accent5"/>
+            </a:effectRef>
+            <a:fontRef idx="minor">
+              <a:schemeClr val="dk1"/>
+            </a:fontRef>
+          </p:style>
+          <p:txBody>
+            <a:bodyPr rtlCol="0" anchor="ctr"/>
+            <a:lstStyle/>
+            <a:p>
+              <a:pPr algn="ctr"/>
+              <a:endParaRPr lang="en-US"/>
+            </a:p>
+          </p:txBody>
+        </p:sp>
+        <p:sp>
+          <p:nvSpPr>
+            <p:cNvPr id="7" name="Rectangle 6">
+              <a:extLst>
+                <a:ext uri="{FF2B5EF4-FFF2-40B4-BE49-F238E27FC236}">
+                  <a16:creationId xmlns:a16="http://schemas.microsoft.com/office/drawing/2014/main" id="{9174242A-6E7E-4FCA-9B2E-B2FC955B56D9}"/>
+                </a:ext>
+              </a:extLst>
+            </p:cNvPr>
+            <p:cNvSpPr/>
+            <p:nvPr/>
+          </p:nvSpPr>
+          <p:spPr>
+            <a:xfrm>
+              <a:off x="6435916" y="1835820"/>
+              <a:ext cx="210691" cy="366603"/>
+            </a:xfrm>
+            <a:prstGeom prst="rect">
+              <a:avLst/>
+            </a:prstGeom>
+          </p:spPr>
+          <p:style>
+            <a:lnRef idx="2">
+              <a:schemeClr val="accent5"/>
+            </a:lnRef>
+            <a:fillRef idx="1">
+              <a:schemeClr val="lt1"/>
+            </a:fillRef>
+            <a:effectRef idx="0">
+              <a:schemeClr val="accent5"/>
+            </a:effectRef>
+            <a:fontRef idx="minor">
+              <a:schemeClr val="dk1"/>
+            </a:fontRef>
+          </p:style>
+          <p:txBody>
+            <a:bodyPr rtlCol="0" anchor="ctr"/>
+            <a:lstStyle/>
+            <a:p>
+              <a:pPr algn="ctr"/>
+              <a:endParaRPr lang="en-US"/>
+            </a:p>
+          </p:txBody>
+        </p:sp>
+        <p:sp>
+          <p:nvSpPr>
+            <p:cNvPr id="8" name="Arrow: Right 7">
+              <a:extLst>
+                <a:ext uri="{FF2B5EF4-FFF2-40B4-BE49-F238E27FC236}">
+                  <a16:creationId xmlns:a16="http://schemas.microsoft.com/office/drawing/2014/main" id="{A37D5CB8-F98F-43F3-A912-CAC0C34A3DC6}"/>
+                </a:ext>
+              </a:extLst>
+            </p:cNvPr>
+            <p:cNvSpPr/>
+            <p:nvPr/>
+          </p:nvSpPr>
+          <p:spPr>
+            <a:xfrm>
+              <a:off x="6702090" y="1966098"/>
+              <a:ext cx="632074" cy="106045"/>
+            </a:xfrm>
+            <a:prstGeom prst="rightArrow">
+              <a:avLst/>
+            </a:prstGeom>
+          </p:spPr>
+          <p:style>
+            <a:lnRef idx="2">
+              <a:schemeClr val="dk1">
+                <a:shade val="50000"/>
+              </a:schemeClr>
+            </a:lnRef>
+            <a:fillRef idx="1">
+              <a:schemeClr val="dk1"/>
+            </a:fillRef>
+            <a:effectRef idx="0">
+              <a:schemeClr val="dk1"/>
+            </a:effectRef>
+            <a:fontRef idx="minor">
+              <a:schemeClr val="lt1"/>
+            </a:fontRef>
+          </p:style>
+          <p:txBody>
+            <a:bodyPr rtlCol="0" anchor="ctr"/>
+            <a:lstStyle/>
+            <a:p>
+              <a:pPr algn="ctr"/>
+              <a:endParaRPr lang="en-US"/>
+            </a:p>
+          </p:txBody>
+        </p:sp>
+        <p:sp>
+          <p:nvSpPr>
+            <p:cNvPr id="9" name="Rectangle 8">
+              <a:extLst>
+                <a:ext uri="{FF2B5EF4-FFF2-40B4-BE49-F238E27FC236}">
+                  <a16:creationId xmlns:a16="http://schemas.microsoft.com/office/drawing/2014/main" id="{BC2C224A-F386-46AE-8445-BA441CF7B9BC}"/>
+                </a:ext>
+              </a:extLst>
+            </p:cNvPr>
+            <p:cNvSpPr/>
+            <p:nvPr/>
+          </p:nvSpPr>
+          <p:spPr>
+            <a:xfrm>
+              <a:off x="5874072" y="1759973"/>
+              <a:ext cx="1567543" cy="518300"/>
+            </a:xfrm>
+            <a:prstGeom prst="rect">
+              <a:avLst/>
+            </a:prstGeom>
+            <a:noFill/>
+          </p:spPr>
+          <p:style>
+            <a:lnRef idx="2">
+              <a:schemeClr val="accent5"/>
+            </a:lnRef>
+            <a:fillRef idx="1">
+              <a:schemeClr val="lt1"/>
+            </a:fillRef>
+            <a:effectRef idx="0">
+              <a:schemeClr val="accent5"/>
+            </a:effectRef>
+            <a:fontRef idx="minor">
+              <a:schemeClr val="dk1"/>
+            </a:fontRef>
+          </p:style>
+          <p:txBody>
+            <a:bodyPr rtlCol="0" anchor="ctr"/>
+            <a:lstStyle/>
+            <a:p>
+              <a:pPr algn="ctr"/>
+              <a:endParaRPr lang="en-US"/>
+            </a:p>
+          </p:txBody>
+        </p:sp>
+      </p:grpSp>
+      <p:sp>
+        <p:nvSpPr>
+          <p:cNvPr id="10" name="TextBox 9">
+            <a:extLst>
+              <a:ext uri="{FF2B5EF4-FFF2-40B4-BE49-F238E27FC236}">
+                <a16:creationId xmlns:a16="http://schemas.microsoft.com/office/drawing/2014/main" id="{F524F74C-1787-4AF5-8D0E-3DB2EE4A5660}"/>
+              </a:ext>
+            </a:extLst>
+          </p:cNvPr>
+          <p:cNvSpPr txBox="1"/>
+          <p:nvPr/>
+        </p:nvSpPr>
+        <p:spPr>
+          <a:xfrm>
+            <a:off x="8167456" y="1027906"/>
+            <a:ext cx="1074198" cy="369332"/>
+          </a:xfrm>
+          <a:prstGeom prst="rect">
+            <a:avLst/>
+          </a:prstGeom>
+          <a:noFill/>
+        </p:spPr>
+        <p:txBody>
+          <a:bodyPr wrap="square" rtlCol="0">
+            <a:spAutoFit/>
+          </a:bodyPr>
+          <a:lstStyle/>
+          <a:p>
+            <a:r>
+              <a:rPr lang="en-US" dirty="0"/>
+              <a:t>queue</a:t>
+            </a:r>
+          </a:p>
+        </p:txBody>
+      </p:sp>
+      <p:sp>
+        <p:nvSpPr>
+          <p:cNvPr id="11" name="TextBox 10">
+            <a:extLst>
+              <a:ext uri="{FF2B5EF4-FFF2-40B4-BE49-F238E27FC236}">
+                <a16:creationId xmlns:a16="http://schemas.microsoft.com/office/drawing/2014/main" id="{EA294256-5526-42F1-9AB3-7D5D9FC38219}"/>
+              </a:ext>
+            </a:extLst>
+          </p:cNvPr>
+          <p:cNvSpPr txBox="1"/>
+          <p:nvPr/>
+        </p:nvSpPr>
+        <p:spPr>
+          <a:xfrm>
+            <a:off x="10099124" y="1018604"/>
+            <a:ext cx="1468480" cy="369332"/>
+          </a:xfrm>
+          <a:prstGeom prst="rect">
+            <a:avLst/>
+          </a:prstGeom>
+          <a:noFill/>
+        </p:spPr>
+        <p:txBody>
+          <a:bodyPr wrap="square" rtlCol="0">
+            <a:spAutoFit/>
+          </a:bodyPr>
+          <a:lstStyle/>
+          <a:p>
+            <a:r>
+              <a:rPr lang="en-US" dirty="0"/>
+              <a:t>Pipe/wire</a:t>
+            </a:r>
+          </a:p>
+        </p:txBody>
+      </p:sp>
+      <p:cxnSp>
+        <p:nvCxnSpPr>
+          <p:cNvPr id="13" name="Straight Arrow Connector 12">
+            <a:extLst>
+              <a:ext uri="{FF2B5EF4-FFF2-40B4-BE49-F238E27FC236}">
+                <a16:creationId xmlns:a16="http://schemas.microsoft.com/office/drawing/2014/main" id="{D710A05A-3BC1-4861-88BF-D381C98304A5}"/>
+              </a:ext>
+            </a:extLst>
+          </p:cNvPr>
+          <p:cNvCxnSpPr>
+            <a:stCxn id="10" idx="2"/>
+            <a:endCxn id="6" idx="0"/>
+          </p:cNvCxnSpPr>
+          <p:nvPr/>
+        </p:nvCxnSpPr>
+        <p:spPr>
+          <a:xfrm>
+            <a:off x="8704555" y="1397238"/>
+            <a:ext cx="664172" cy="504235"/>
+          </a:xfrm>
+          <a:prstGeom prst="straightConnector1">
+            <a:avLst/>
+          </a:prstGeom>
+          <a:ln>
+            <a:tailEnd type="triangle"/>
+          </a:ln>
+        </p:spPr>
+        <p:style>
+          <a:lnRef idx="1">
+            <a:schemeClr val="accent1"/>
+          </a:lnRef>
+          <a:fillRef idx="0">
+            <a:schemeClr val="accent1"/>
+          </a:fillRef>
+          <a:effectRef idx="0">
+            <a:schemeClr val="accent1"/>
+          </a:effectRef>
+          <a:fontRef idx="minor">
+            <a:schemeClr val="tx1"/>
+          </a:fontRef>
+        </p:style>
+      </p:cxnSp>
+      <p:cxnSp>
+        <p:nvCxnSpPr>
+          <p:cNvPr id="14" name="Straight Arrow Connector 13">
+            <a:extLst>
+              <a:ext uri="{FF2B5EF4-FFF2-40B4-BE49-F238E27FC236}">
+                <a16:creationId xmlns:a16="http://schemas.microsoft.com/office/drawing/2014/main" id="{06E40866-BECA-47E6-9B44-B2FBE3408F87}"/>
+              </a:ext>
+            </a:extLst>
+          </p:cNvPr>
+          <p:cNvCxnSpPr>
+            <a:cxnSpLocks/>
+          </p:cNvCxnSpPr>
+          <p:nvPr/>
+        </p:nvCxnSpPr>
+        <p:spPr>
+          <a:xfrm flipH="1">
+            <a:off x="10153201" y="1387936"/>
+            <a:ext cx="512474" cy="643814"/>
+          </a:xfrm>
+          <a:prstGeom prst="straightConnector1">
+            <a:avLst/>
+          </a:prstGeom>
+          <a:ln>
+            <a:tailEnd type="triangle"/>
+          </a:ln>
+        </p:spPr>
+        <p:style>
+          <a:lnRef idx="1">
+            <a:schemeClr val="accent1"/>
+          </a:lnRef>
+          <a:fillRef idx="0">
+            <a:schemeClr val="accent1"/>
+          </a:fillRef>
+          <a:effectRef idx="0">
+            <a:schemeClr val="accent1"/>
+          </a:effectRef>
+          <a:fontRef idx="minor">
+            <a:schemeClr val="tx1"/>
+          </a:fontRef>
+        </p:style>
+      </p:cxnSp>
+    </p:spTree>
+    <p:extLst>
+      <p:ext uri="{BB962C8B-B14F-4D97-AF65-F5344CB8AC3E}">
+        <p14:creationId xmlns:p14="http://schemas.microsoft.com/office/powerpoint/2010/main" val="3750024603"/>
       </p:ext>
     </p:extLst>
   </p:cSld>

</xml_diff>

<commit_message>
lots of rework. maxDeliveryRate in Node defines transmission delay
</commit_message>
<xml_diff>
--- a/doc/plan.pptx
+++ b/doc/plan.pptx
@@ -22,6 +22,8 @@
     <p:sldId id="269" r:id="rId16"/>
     <p:sldId id="270" r:id="rId17"/>
     <p:sldId id="272" r:id="rId18"/>
+    <p:sldId id="273" r:id="rId19"/>
+    <p:sldId id="274" r:id="rId20"/>
   </p:sldIdLst>
   <p:sldSz cx="12192000" cy="6858000"/>
   <p:notesSz cx="6858000" cy="9144000"/>
@@ -275,7 +277,7 @@
           <a:p>
             <a:fld id="{2EE5EF10-3D11-419F-A8C1-99878D53651A}" type="datetimeFigureOut">
               <a:rPr lang="en-US" smtClean="0"/>
-              <a:t>2/22/2021</a:t>
+              <a:t>2/28/2021</a:t>
             </a:fld>
             <a:endParaRPr lang="en-US"/>
           </a:p>
@@ -473,7 +475,7 @@
           <a:p>
             <a:fld id="{2EE5EF10-3D11-419F-A8C1-99878D53651A}" type="datetimeFigureOut">
               <a:rPr lang="en-US" smtClean="0"/>
-              <a:t>2/22/2021</a:t>
+              <a:t>2/28/2021</a:t>
             </a:fld>
             <a:endParaRPr lang="en-US"/>
           </a:p>
@@ -681,7 +683,7 @@
           <a:p>
             <a:fld id="{2EE5EF10-3D11-419F-A8C1-99878D53651A}" type="datetimeFigureOut">
               <a:rPr lang="en-US" smtClean="0"/>
-              <a:t>2/22/2021</a:t>
+              <a:t>2/28/2021</a:t>
             </a:fld>
             <a:endParaRPr lang="en-US"/>
           </a:p>
@@ -879,7 +881,7 @@
           <a:p>
             <a:fld id="{2EE5EF10-3D11-419F-A8C1-99878D53651A}" type="datetimeFigureOut">
               <a:rPr lang="en-US" smtClean="0"/>
-              <a:t>2/22/2021</a:t>
+              <a:t>2/28/2021</a:t>
             </a:fld>
             <a:endParaRPr lang="en-US"/>
           </a:p>
@@ -1154,7 +1156,7 @@
           <a:p>
             <a:fld id="{2EE5EF10-3D11-419F-A8C1-99878D53651A}" type="datetimeFigureOut">
               <a:rPr lang="en-US" smtClean="0"/>
-              <a:t>2/22/2021</a:t>
+              <a:t>2/28/2021</a:t>
             </a:fld>
             <a:endParaRPr lang="en-US"/>
           </a:p>
@@ -1419,7 +1421,7 @@
           <a:p>
             <a:fld id="{2EE5EF10-3D11-419F-A8C1-99878D53651A}" type="datetimeFigureOut">
               <a:rPr lang="en-US" smtClean="0"/>
-              <a:t>2/22/2021</a:t>
+              <a:t>2/28/2021</a:t>
             </a:fld>
             <a:endParaRPr lang="en-US"/>
           </a:p>
@@ -1831,7 +1833,7 @@
           <a:p>
             <a:fld id="{2EE5EF10-3D11-419F-A8C1-99878D53651A}" type="datetimeFigureOut">
               <a:rPr lang="en-US" smtClean="0"/>
-              <a:t>2/22/2021</a:t>
+              <a:t>2/28/2021</a:t>
             </a:fld>
             <a:endParaRPr lang="en-US"/>
           </a:p>
@@ -1972,7 +1974,7 @@
           <a:p>
             <a:fld id="{2EE5EF10-3D11-419F-A8C1-99878D53651A}" type="datetimeFigureOut">
               <a:rPr lang="en-US" smtClean="0"/>
-              <a:t>2/22/2021</a:t>
+              <a:t>2/28/2021</a:t>
             </a:fld>
             <a:endParaRPr lang="en-US"/>
           </a:p>
@@ -2085,7 +2087,7 @@
           <a:p>
             <a:fld id="{2EE5EF10-3D11-419F-A8C1-99878D53651A}" type="datetimeFigureOut">
               <a:rPr lang="en-US" smtClean="0"/>
-              <a:t>2/22/2021</a:t>
+              <a:t>2/28/2021</a:t>
             </a:fld>
             <a:endParaRPr lang="en-US"/>
           </a:p>
@@ -2396,7 +2398,7 @@
           <a:p>
             <a:fld id="{2EE5EF10-3D11-419F-A8C1-99878D53651A}" type="datetimeFigureOut">
               <a:rPr lang="en-US" smtClean="0"/>
-              <a:t>2/22/2021</a:t>
+              <a:t>2/28/2021</a:t>
             </a:fld>
             <a:endParaRPr lang="en-US"/>
           </a:p>
@@ -2684,7 +2686,7 @@
           <a:p>
             <a:fld id="{2EE5EF10-3D11-419F-A8C1-99878D53651A}" type="datetimeFigureOut">
               <a:rPr lang="en-US" smtClean="0"/>
-              <a:t>2/22/2021</a:t>
+              <a:t>2/28/2021</a:t>
             </a:fld>
             <a:endParaRPr lang="en-US"/>
           </a:p>
@@ -2925,7 +2927,7 @@
           <a:p>
             <a:fld id="{2EE5EF10-3D11-419F-A8C1-99878D53651A}" type="datetimeFigureOut">
               <a:rPr lang="en-US" smtClean="0"/>
-              <a:t>2/22/2021</a:t>
+              <a:t>2/28/2021</a:t>
             </a:fld>
             <a:endParaRPr lang="en-US"/>
           </a:p>
@@ -6640,10 +6642,63 @@
         </p:nvSpPr>
         <p:spPr/>
         <p:txBody>
-          <a:bodyPr/>
+          <a:bodyPr>
+            <a:normAutofit lnSpcReduction="10000"/>
+          </a:bodyPr>
           <a:lstStyle/>
           <a:p>
-            <a:endParaRPr lang="en-US"/>
+            <a:r>
+              <a:rPr lang="en-US" dirty="0"/>
+              <a:t>Resolution parameter in Nodes and Clients are not used in Event Queue model</a:t>
+            </a:r>
+          </a:p>
+          <a:p>
+            <a:r>
+              <a:rPr lang="en-US" dirty="0" err="1"/>
+              <a:t>EventQueue</a:t>
+            </a:r>
+            <a:r>
+              <a:rPr lang="en-US" dirty="0"/>
+              <a:t> with actual time will create </a:t>
+            </a:r>
+            <a:r>
+              <a:rPr lang="en-US" b="1" dirty="0"/>
+              <a:t>time gaps </a:t>
+            </a:r>
+            <a:r>
+              <a:rPr lang="en-US" dirty="0"/>
+              <a:t>in creating and routing packets, because of processing of events. So, instead, we create simulation timestep which increases by 1 after each step. The resolution parameter says whether it’s a </a:t>
+            </a:r>
+            <a:r>
+              <a:rPr lang="en-US" dirty="0" err="1"/>
+              <a:t>ms</a:t>
+            </a:r>
+            <a:r>
+              <a:rPr lang="en-US" dirty="0"/>
+              <a:t>/</a:t>
+            </a:r>
+            <a:r>
+              <a:rPr lang="en-US" dirty="0" err="1"/>
+              <a:t>mcs</a:t>
+            </a:r>
+            <a:r>
+              <a:rPr lang="en-US" dirty="0"/>
+              <a:t>/ns. A lot of other parameters are defined in </a:t>
+            </a:r>
+            <a:r>
+              <a:rPr lang="en-US" dirty="0" err="1"/>
+              <a:t>ms</a:t>
+            </a:r>
+            <a:r>
+              <a:rPr lang="en-US" dirty="0"/>
+              <a:t>/s. So, we need to adjust their calculations based on simulation timestep unit.</a:t>
+            </a:r>
+          </a:p>
+          <a:p>
+            <a:r>
+              <a:rPr lang="en-US" dirty="0"/>
+              <a:t>Heap is sometime reconstructed and events with the same time can be reordered. So, we need to serialize events by adding microseconds.</a:t>
+            </a:r>
           </a:p>
         </p:txBody>
       </p:sp>
@@ -6651,6 +6706,314 @@
     <p:extLst>
       <p:ext uri="{BB962C8B-B14F-4D97-AF65-F5344CB8AC3E}">
         <p14:creationId xmlns:p14="http://schemas.microsoft.com/office/powerpoint/2010/main" val="2008062780"/>
+      </p:ext>
+    </p:extLst>
+  </p:cSld>
+  <p:clrMapOvr>
+    <a:masterClrMapping/>
+  </p:clrMapOvr>
+</p:sld>
+</file>
+
+<file path=ppt/slides/slide18.xml><?xml version="1.0" encoding="utf-8"?>
+<p:sld xmlns:a="http://schemas.openxmlformats.org/drawingml/2006/main" xmlns:r="http://schemas.openxmlformats.org/officeDocument/2006/relationships" xmlns:p="http://schemas.openxmlformats.org/presentationml/2006/main">
+  <p:cSld>
+    <p:spTree>
+      <p:nvGrpSpPr>
+        <p:cNvPr id="1" name=""/>
+        <p:cNvGrpSpPr/>
+        <p:nvPr/>
+      </p:nvGrpSpPr>
+      <p:grpSpPr>
+        <a:xfrm>
+          <a:off x="0" y="0"/>
+          <a:ext cx="0" cy="0"/>
+          <a:chOff x="0" y="0"/>
+          <a:chExt cx="0" cy="0"/>
+        </a:xfrm>
+      </p:grpSpPr>
+      <p:sp>
+        <p:nvSpPr>
+          <p:cNvPr id="2" name="Title 1">
+            <a:extLst>
+              <a:ext uri="{FF2B5EF4-FFF2-40B4-BE49-F238E27FC236}">
+                <a16:creationId xmlns:a16="http://schemas.microsoft.com/office/drawing/2014/main" id="{CE25493D-F2E8-46C3-A547-911E124EB9F8}"/>
+              </a:ext>
+            </a:extLst>
+          </p:cNvPr>
+          <p:cNvSpPr>
+            <a:spLocks noGrp="1"/>
+          </p:cNvSpPr>
+          <p:nvPr>
+            <p:ph type="title"/>
+          </p:nvPr>
+        </p:nvSpPr>
+        <p:spPr/>
+        <p:txBody>
+          <a:bodyPr/>
+          <a:lstStyle/>
+          <a:p>
+            <a:r>
+              <a:rPr lang="en-US" dirty="0"/>
+              <a:t>Transmission delay in MS</a:t>
+            </a:r>
+          </a:p>
+        </p:txBody>
+      </p:sp>
+      <p:sp>
+        <p:nvSpPr>
+          <p:cNvPr id="3" name="Content Placeholder 2">
+            <a:extLst>
+              <a:ext uri="{FF2B5EF4-FFF2-40B4-BE49-F238E27FC236}">
+                <a16:creationId xmlns:a16="http://schemas.microsoft.com/office/drawing/2014/main" id="{A1DD7359-0EBE-4A37-B0D8-ADB0C7585AF8}"/>
+              </a:ext>
+            </a:extLst>
+          </p:cNvPr>
+          <p:cNvSpPr>
+            <a:spLocks noGrp="1"/>
+          </p:cNvSpPr>
+          <p:nvPr>
+            <p:ph idx="1"/>
+          </p:nvPr>
+        </p:nvSpPr>
+        <p:spPr/>
+        <p:txBody>
+          <a:bodyPr/>
+          <a:lstStyle/>
+          <a:p>
+            <a:pPr marL="0" indent="0">
+              <a:buNone/>
+            </a:pPr>
+            <a:r>
+              <a:rPr lang="en-US" dirty="0"/>
+              <a:t>Transmission delay is the amount of time required to push one BYTE to a channel: A 20 B packet requires: </a:t>
+            </a:r>
+          </a:p>
+          <a:p>
+            <a:pPr marL="0" indent="0">
+              <a:buNone/>
+            </a:pPr>
+            <a:r>
+              <a:rPr lang="en-US" dirty="0"/>
+              <a:t>20 * </a:t>
+            </a:r>
+            <a:r>
+              <a:rPr lang="en-US" dirty="0" err="1"/>
+              <a:t>transmissionDelayPerByte</a:t>
+            </a:r>
+            <a:r>
+              <a:rPr lang="en-US" dirty="0"/>
+              <a:t> amount of time.</a:t>
+            </a:r>
+          </a:p>
+          <a:p>
+            <a:pPr marL="0" indent="0">
+              <a:buNone/>
+            </a:pPr>
+            <a:endParaRPr lang="en-US" dirty="0"/>
+          </a:p>
+          <a:p>
+            <a:pPr marL="0" indent="0">
+              <a:buNone/>
+            </a:pPr>
+            <a:r>
+              <a:rPr lang="en-US" dirty="0"/>
+              <a:t>If </a:t>
+            </a:r>
+            <a:r>
+              <a:rPr lang="en-US" b="1" dirty="0" err="1"/>
+              <a:t>transmissionDelayPerByte</a:t>
+            </a:r>
+            <a:r>
+              <a:rPr lang="en-US" dirty="0"/>
+              <a:t> is 0.0001ms, it would take 0.002 </a:t>
+            </a:r>
+            <a:r>
+              <a:rPr lang="en-US" dirty="0" err="1"/>
+              <a:t>ms</a:t>
+            </a:r>
+            <a:r>
+              <a:rPr lang="en-US" dirty="0"/>
+              <a:t> or 2 </a:t>
+            </a:r>
+            <a:r>
+              <a:rPr lang="en-US"/>
+              <a:t>micro seconds </a:t>
+            </a:r>
+            <a:r>
+              <a:rPr lang="en-US" dirty="0"/>
+              <a:t>to push the packet into a channel. </a:t>
+            </a:r>
+          </a:p>
+          <a:p>
+            <a:endParaRPr lang="en-US" dirty="0"/>
+          </a:p>
+        </p:txBody>
+      </p:sp>
+    </p:spTree>
+    <p:extLst>
+      <p:ext uri="{BB962C8B-B14F-4D97-AF65-F5344CB8AC3E}">
+        <p14:creationId xmlns:p14="http://schemas.microsoft.com/office/powerpoint/2010/main" val="3171713153"/>
+      </p:ext>
+    </p:extLst>
+  </p:cSld>
+  <p:clrMapOvr>
+    <a:masterClrMapping/>
+  </p:clrMapOvr>
+</p:sld>
+</file>
+
+<file path=ppt/slides/slide19.xml><?xml version="1.0" encoding="utf-8"?>
+<p:sld xmlns:a="http://schemas.openxmlformats.org/drawingml/2006/main" xmlns:r="http://schemas.openxmlformats.org/officeDocument/2006/relationships" xmlns:p="http://schemas.openxmlformats.org/presentationml/2006/main">
+  <p:cSld>
+    <p:spTree>
+      <p:nvGrpSpPr>
+        <p:cNvPr id="1" name=""/>
+        <p:cNvGrpSpPr/>
+        <p:nvPr/>
+      </p:nvGrpSpPr>
+      <p:grpSpPr>
+        <a:xfrm>
+          <a:off x="0" y="0"/>
+          <a:ext cx="0" cy="0"/>
+          <a:chOff x="0" y="0"/>
+          <a:chExt cx="0" cy="0"/>
+        </a:xfrm>
+      </p:grpSpPr>
+      <p:sp>
+        <p:nvSpPr>
+          <p:cNvPr id="2" name="Title 1">
+            <a:extLst>
+              <a:ext uri="{FF2B5EF4-FFF2-40B4-BE49-F238E27FC236}">
+                <a16:creationId xmlns:a16="http://schemas.microsoft.com/office/drawing/2014/main" id="{D8449BCD-2DDB-49AE-A814-1FC20D297545}"/>
+              </a:ext>
+            </a:extLst>
+          </p:cNvPr>
+          <p:cNvSpPr>
+            <a:spLocks noGrp="1"/>
+          </p:cNvSpPr>
+          <p:nvPr>
+            <p:ph type="title"/>
+          </p:nvPr>
+        </p:nvSpPr>
+        <p:spPr/>
+        <p:txBody>
+          <a:bodyPr/>
+          <a:lstStyle/>
+          <a:p>
+            <a:r>
+              <a:rPr lang="en-US" dirty="0"/>
+              <a:t>Where there will be no queuing</a:t>
+            </a:r>
+          </a:p>
+        </p:txBody>
+      </p:sp>
+      <p:sp>
+        <p:nvSpPr>
+          <p:cNvPr id="3" name="Content Placeholder 2">
+            <a:extLst>
+              <a:ext uri="{FF2B5EF4-FFF2-40B4-BE49-F238E27FC236}">
+                <a16:creationId xmlns:a16="http://schemas.microsoft.com/office/drawing/2014/main" id="{62CDB0F8-7CA7-423C-8485-0B4986D5C0B4}"/>
+              </a:ext>
+            </a:extLst>
+          </p:cNvPr>
+          <p:cNvSpPr>
+            <a:spLocks noGrp="1"/>
+          </p:cNvSpPr>
+          <p:nvPr>
+            <p:ph idx="1"/>
+          </p:nvPr>
+        </p:nvSpPr>
+        <p:spPr/>
+        <p:txBody>
+          <a:bodyPr>
+            <a:normAutofit fontScale="92500" lnSpcReduction="10000"/>
+          </a:bodyPr>
+          <a:lstStyle/>
+          <a:p>
+            <a:pPr marL="0" indent="0">
+              <a:buNone/>
+            </a:pPr>
+            <a:r>
+              <a:rPr lang="en-US" dirty="0"/>
+              <a:t>Let’s say our queue size is 5 and 5 packets arrived at time 1000Here are the events that will happen:</a:t>
+            </a:r>
+          </a:p>
+          <a:p>
+            <a:pPr marL="0" indent="0">
+              <a:buNone/>
+            </a:pPr>
+            <a:r>
+              <a:rPr lang="en-US" dirty="0"/>
+              <a:t>Arrive p1</a:t>
+            </a:r>
+          </a:p>
+          <a:p>
+            <a:pPr marL="0" indent="0">
+              <a:buNone/>
+            </a:pPr>
+            <a:r>
+              <a:rPr lang="en-US" dirty="0"/>
+              <a:t>Channel p1 (because as queue was empty, p1 will be pushed to the channel at 1000)</a:t>
+            </a:r>
+          </a:p>
+          <a:p>
+            <a:pPr marL="0" indent="0">
+              <a:buNone/>
+            </a:pPr>
+            <a:r>
+              <a:rPr lang="en-US" dirty="0"/>
+              <a:t>Arrive p2</a:t>
+            </a:r>
+          </a:p>
+          <a:p>
+            <a:pPr marL="0" indent="0">
+              <a:buNone/>
+            </a:pPr>
+            <a:r>
+              <a:rPr lang="en-US" dirty="0"/>
+              <a:t>Channel p2</a:t>
+            </a:r>
+          </a:p>
+          <a:p>
+            <a:pPr marL="0" indent="0">
+              <a:buNone/>
+            </a:pPr>
+            <a:r>
+              <a:rPr lang="en-US" dirty="0" err="1"/>
+              <a:t>Arri</a:t>
+            </a:r>
+            <a:r>
+              <a:rPr lang="en-US" dirty="0"/>
+              <a:t>…</a:t>
+            </a:r>
+          </a:p>
+          <a:p>
+            <a:pPr marL="0" indent="0">
+              <a:buNone/>
+            </a:pPr>
+            <a:r>
+              <a:rPr lang="en-US" dirty="0"/>
+              <a:t>Because even if we had [A1, A2, A3, A4, A5] in the event queue at time 1000. Each of the arrival event will be put before the pending arrival events. So, queue will never have </a:t>
+            </a:r>
+            <a:r>
+              <a:rPr lang="en-US"/>
+              <a:t>more than 1 item.</a:t>
+            </a:r>
+            <a:endParaRPr lang="en-US" dirty="0"/>
+          </a:p>
+          <a:p>
+            <a:pPr marL="0" indent="0">
+              <a:buNone/>
+            </a:pPr>
+            <a:endParaRPr lang="en-US" dirty="0"/>
+          </a:p>
+        </p:txBody>
+      </p:sp>
+    </p:spTree>
+    <p:extLst>
+      <p:ext uri="{BB962C8B-B14F-4D97-AF65-F5344CB8AC3E}">
+        <p14:creationId xmlns:p14="http://schemas.microsoft.com/office/powerpoint/2010/main" val="2893417731"/>
       </p:ext>
     </p:extLst>
   </p:cSld>

</xml_diff>

<commit_message>
good results on throughput
</commit_message>
<xml_diff>
--- a/doc/plan.pptx
+++ b/doc/plan.pptx
@@ -36,7 +36,9 @@
     <p:sldId id="278" r:id="rId30"/>
     <p:sldId id="279" r:id="rId31"/>
     <p:sldId id="280" r:id="rId32"/>
-    <p:sldId id="287" r:id="rId33"/>
+    <p:sldId id="288" r:id="rId33"/>
+    <p:sldId id="287" r:id="rId34"/>
+    <p:sldId id="289" r:id="rId35"/>
   </p:sldIdLst>
   <p:sldSz cx="12192000" cy="6858000"/>
   <p:notesSz cx="6858000" cy="9144000"/>
@@ -290,7 +292,7 @@
           <a:p>
             <a:fld id="{2EE5EF10-3D11-419F-A8C1-99878D53651A}" type="datetimeFigureOut">
               <a:rPr lang="en-US" smtClean="0"/>
-              <a:t>4/19/2021</a:t>
+              <a:t>5/14/2021</a:t>
             </a:fld>
             <a:endParaRPr lang="en-US"/>
           </a:p>
@@ -488,7 +490,7 @@
           <a:p>
             <a:fld id="{2EE5EF10-3D11-419F-A8C1-99878D53651A}" type="datetimeFigureOut">
               <a:rPr lang="en-US" smtClean="0"/>
-              <a:t>4/19/2021</a:t>
+              <a:t>5/14/2021</a:t>
             </a:fld>
             <a:endParaRPr lang="en-US"/>
           </a:p>
@@ -696,7 +698,7 @@
           <a:p>
             <a:fld id="{2EE5EF10-3D11-419F-A8C1-99878D53651A}" type="datetimeFigureOut">
               <a:rPr lang="en-US" smtClean="0"/>
-              <a:t>4/19/2021</a:t>
+              <a:t>5/14/2021</a:t>
             </a:fld>
             <a:endParaRPr lang="en-US"/>
           </a:p>
@@ -894,7 +896,7 @@
           <a:p>
             <a:fld id="{2EE5EF10-3D11-419F-A8C1-99878D53651A}" type="datetimeFigureOut">
               <a:rPr lang="en-US" smtClean="0"/>
-              <a:t>4/19/2021</a:t>
+              <a:t>5/14/2021</a:t>
             </a:fld>
             <a:endParaRPr lang="en-US"/>
           </a:p>
@@ -1169,7 +1171,7 @@
           <a:p>
             <a:fld id="{2EE5EF10-3D11-419F-A8C1-99878D53651A}" type="datetimeFigureOut">
               <a:rPr lang="en-US" smtClean="0"/>
-              <a:t>4/19/2021</a:t>
+              <a:t>5/14/2021</a:t>
             </a:fld>
             <a:endParaRPr lang="en-US"/>
           </a:p>
@@ -1434,7 +1436,7 @@
           <a:p>
             <a:fld id="{2EE5EF10-3D11-419F-A8C1-99878D53651A}" type="datetimeFigureOut">
               <a:rPr lang="en-US" smtClean="0"/>
-              <a:t>4/19/2021</a:t>
+              <a:t>5/14/2021</a:t>
             </a:fld>
             <a:endParaRPr lang="en-US"/>
           </a:p>
@@ -1846,7 +1848,7 @@
           <a:p>
             <a:fld id="{2EE5EF10-3D11-419F-A8C1-99878D53651A}" type="datetimeFigureOut">
               <a:rPr lang="en-US" smtClean="0"/>
-              <a:t>4/19/2021</a:t>
+              <a:t>5/14/2021</a:t>
             </a:fld>
             <a:endParaRPr lang="en-US"/>
           </a:p>
@@ -1987,7 +1989,7 @@
           <a:p>
             <a:fld id="{2EE5EF10-3D11-419F-A8C1-99878D53651A}" type="datetimeFigureOut">
               <a:rPr lang="en-US" smtClean="0"/>
-              <a:t>4/19/2021</a:t>
+              <a:t>5/14/2021</a:t>
             </a:fld>
             <a:endParaRPr lang="en-US"/>
           </a:p>
@@ -2100,7 +2102,7 @@
           <a:p>
             <a:fld id="{2EE5EF10-3D11-419F-A8C1-99878D53651A}" type="datetimeFigureOut">
               <a:rPr lang="en-US" smtClean="0"/>
-              <a:t>4/19/2021</a:t>
+              <a:t>5/14/2021</a:t>
             </a:fld>
             <a:endParaRPr lang="en-US"/>
           </a:p>
@@ -2411,7 +2413,7 @@
           <a:p>
             <a:fld id="{2EE5EF10-3D11-419F-A8C1-99878D53651A}" type="datetimeFigureOut">
               <a:rPr lang="en-US" smtClean="0"/>
-              <a:t>4/19/2021</a:t>
+              <a:t>5/14/2021</a:t>
             </a:fld>
             <a:endParaRPr lang="en-US"/>
           </a:p>
@@ -2699,7 +2701,7 @@
           <a:p>
             <a:fld id="{2EE5EF10-3D11-419F-A8C1-99878D53651A}" type="datetimeFigureOut">
               <a:rPr lang="en-US" smtClean="0"/>
-              <a:t>4/19/2021</a:t>
+              <a:t>5/14/2021</a:t>
             </a:fld>
             <a:endParaRPr lang="en-US"/>
           </a:p>
@@ -2940,7 +2942,7 @@
           <a:p>
             <a:fld id="{2EE5EF10-3D11-419F-A8C1-99878D53651A}" type="datetimeFigureOut">
               <a:rPr lang="en-US" smtClean="0"/>
-              <a:t>4/19/2021</a:t>
+              <a:t>5/14/2021</a:t>
             </a:fld>
             <a:endParaRPr lang="en-US"/>
           </a:p>
@@ -13753,7 +13755,7 @@
           <p:cNvPr id="2" name="Title 1">
             <a:extLst>
               <a:ext uri="{FF2B5EF4-FFF2-40B4-BE49-F238E27FC236}">
-                <a16:creationId xmlns:a16="http://schemas.microsoft.com/office/drawing/2014/main" id="{D9522911-554A-4D10-87E6-C465F7CB88DF}"/>
+                <a16:creationId xmlns:a16="http://schemas.microsoft.com/office/drawing/2014/main" id="{B7A17A9A-8688-43FB-AA33-F051DA2A5A14}"/>
               </a:ext>
             </a:extLst>
           </p:cNvPr>
@@ -13769,7 +13771,1249 @@
           <a:bodyPr/>
           <a:lstStyle/>
           <a:p>
-            <a:endParaRPr lang="en-US" dirty="0"/>
+            <a:r>
+              <a:rPr lang="en-US" dirty="0"/>
+              <a:t>Event Simulator</a:t>
+            </a:r>
+          </a:p>
+        </p:txBody>
+      </p:sp>
+      <p:sp>
+        <p:nvSpPr>
+          <p:cNvPr id="54" name="TextBox 53">
+            <a:extLst>
+              <a:ext uri="{FF2B5EF4-FFF2-40B4-BE49-F238E27FC236}">
+                <a16:creationId xmlns:a16="http://schemas.microsoft.com/office/drawing/2014/main" id="{2D003FF0-2E25-44D3-9C97-A162BAD1BE34}"/>
+              </a:ext>
+            </a:extLst>
+          </p:cNvPr>
+          <p:cNvSpPr txBox="1"/>
+          <p:nvPr/>
+        </p:nvSpPr>
+        <p:spPr>
+          <a:xfrm>
+            <a:off x="8373569" y="3461628"/>
+            <a:ext cx="2881746" cy="276999"/>
+          </a:xfrm>
+          <a:prstGeom prst="rect">
+            <a:avLst/>
+          </a:prstGeom>
+          <a:noFill/>
+        </p:spPr>
+        <p:txBody>
+          <a:bodyPr wrap="square" rtlCol="0">
+            <a:spAutoFit/>
+          </a:bodyPr>
+          <a:lstStyle/>
+          <a:p>
+            <a:r>
+              <a:rPr lang="en-US" sz="1200" i="1" dirty="0"/>
+              <a:t>Events = {ArriveNode, EnterChannel}</a:t>
+            </a:r>
+          </a:p>
+        </p:txBody>
+      </p:sp>
+      <p:grpSp>
+        <p:nvGrpSpPr>
+          <p:cNvPr id="72" name="Group 71">
+            <a:extLst>
+              <a:ext uri="{FF2B5EF4-FFF2-40B4-BE49-F238E27FC236}">
+                <a16:creationId xmlns:a16="http://schemas.microsoft.com/office/drawing/2014/main" id="{5D1D3A12-B335-42BB-86F1-2E5A7958C18D}"/>
+              </a:ext>
+            </a:extLst>
+          </p:cNvPr>
+          <p:cNvGrpSpPr/>
+          <p:nvPr/>
+        </p:nvGrpSpPr>
+        <p:grpSpPr>
+          <a:xfrm>
+            <a:off x="2098821" y="1099178"/>
+            <a:ext cx="8523805" cy="4887308"/>
+            <a:chOff x="1341439" y="1070824"/>
+            <a:chExt cx="8523805" cy="4887308"/>
+          </a:xfrm>
+        </p:grpSpPr>
+        <p:sp>
+          <p:nvSpPr>
+            <p:cNvPr id="4" name="Rectangle 3">
+              <a:extLst>
+                <a:ext uri="{FF2B5EF4-FFF2-40B4-BE49-F238E27FC236}">
+                  <a16:creationId xmlns:a16="http://schemas.microsoft.com/office/drawing/2014/main" id="{1837932F-BC5C-4609-8546-9FAAD44D220B}"/>
+                </a:ext>
+              </a:extLst>
+            </p:cNvPr>
+            <p:cNvSpPr/>
+            <p:nvPr/>
+          </p:nvSpPr>
+          <p:spPr>
+            <a:xfrm>
+              <a:off x="4363329" y="2902105"/>
+              <a:ext cx="2130641" cy="523220"/>
+            </a:xfrm>
+            <a:prstGeom prst="rect">
+              <a:avLst/>
+            </a:prstGeom>
+            <a:ln w="25400"/>
+          </p:spPr>
+          <p:style>
+            <a:lnRef idx="2">
+              <a:schemeClr val="accent5"/>
+            </a:lnRef>
+            <a:fillRef idx="1">
+              <a:schemeClr val="lt1"/>
+            </a:fillRef>
+            <a:effectRef idx="0">
+              <a:schemeClr val="accent5"/>
+            </a:effectRef>
+            <a:fontRef idx="minor">
+              <a:schemeClr val="dk1"/>
+            </a:fontRef>
+          </p:style>
+          <p:txBody>
+            <a:bodyPr rtlCol="0" anchor="ctr">
+              <a:spAutoFit/>
+            </a:bodyPr>
+            <a:lstStyle/>
+            <a:p>
+              <a:pPr algn="ctr"/>
+              <a:r>
+                <a:rPr lang="en-US" sz="1400" dirty="0"/>
+                <a:t>Call onTimeStepStart</a:t>
+              </a:r>
+            </a:p>
+            <a:p>
+              <a:pPr algn="ctr"/>
+              <a:r>
+                <a:rPr lang="en-US" sz="1400" dirty="0"/>
+                <a:t> of each node (reset stats)</a:t>
+              </a:r>
+            </a:p>
+          </p:txBody>
+        </p:sp>
+        <p:sp>
+          <p:nvSpPr>
+            <p:cNvPr id="5" name="Rectangle: Rounded Corners 4">
+              <a:extLst>
+                <a:ext uri="{FF2B5EF4-FFF2-40B4-BE49-F238E27FC236}">
+                  <a16:creationId xmlns:a16="http://schemas.microsoft.com/office/drawing/2014/main" id="{235800C0-C5E2-47FD-BDB9-DBE66E7561EE}"/>
+                </a:ext>
+              </a:extLst>
+            </p:cNvPr>
+            <p:cNvSpPr/>
+            <p:nvPr/>
+          </p:nvSpPr>
+          <p:spPr>
+            <a:xfrm>
+              <a:off x="5033591" y="1070824"/>
+              <a:ext cx="790113" cy="328474"/>
+            </a:xfrm>
+            <a:prstGeom prst="roundRect">
+              <a:avLst/>
+            </a:prstGeom>
+          </p:spPr>
+          <p:style>
+            <a:lnRef idx="2">
+              <a:schemeClr val="accent3">
+                <a:shade val="50000"/>
+              </a:schemeClr>
+            </a:lnRef>
+            <a:fillRef idx="1">
+              <a:schemeClr val="accent3"/>
+            </a:fillRef>
+            <a:effectRef idx="0">
+              <a:schemeClr val="accent3"/>
+            </a:effectRef>
+            <a:fontRef idx="minor">
+              <a:schemeClr val="lt1"/>
+            </a:fontRef>
+          </p:style>
+          <p:txBody>
+            <a:bodyPr rtlCol="0" anchor="ctr"/>
+            <a:lstStyle/>
+            <a:p>
+              <a:pPr algn="ctr"/>
+              <a:r>
+                <a:rPr lang="en-US" dirty="0"/>
+                <a:t>start</a:t>
+              </a:r>
+            </a:p>
+          </p:txBody>
+        </p:sp>
+        <p:sp>
+          <p:nvSpPr>
+            <p:cNvPr id="6" name="Diamond 5">
+              <a:extLst>
+                <a:ext uri="{FF2B5EF4-FFF2-40B4-BE49-F238E27FC236}">
+                  <a16:creationId xmlns:a16="http://schemas.microsoft.com/office/drawing/2014/main" id="{2A2E84AC-BE34-436C-80FB-311F1F9D0620}"/>
+                </a:ext>
+              </a:extLst>
+            </p:cNvPr>
+            <p:cNvSpPr/>
+            <p:nvPr/>
+          </p:nvSpPr>
+          <p:spPr>
+            <a:xfrm>
+              <a:off x="4306430" y="1661999"/>
+              <a:ext cx="2244437" cy="917079"/>
+            </a:xfrm>
+            <a:prstGeom prst="diamond">
+              <a:avLst/>
+            </a:prstGeom>
+            <a:solidFill>
+              <a:schemeClr val="tx1"/>
+            </a:solidFill>
+          </p:spPr>
+          <p:style>
+            <a:lnRef idx="2">
+              <a:schemeClr val="accent1">
+                <a:shade val="50000"/>
+              </a:schemeClr>
+            </a:lnRef>
+            <a:fillRef idx="1">
+              <a:schemeClr val="accent1"/>
+            </a:fillRef>
+            <a:effectRef idx="0">
+              <a:schemeClr val="accent1"/>
+            </a:effectRef>
+            <a:fontRef idx="minor">
+              <a:schemeClr val="lt1"/>
+            </a:fontRef>
+          </p:style>
+          <p:txBody>
+            <a:bodyPr rtlCol="0" anchor="ctr">
+              <a:spAutoFit/>
+            </a:bodyPr>
+            <a:lstStyle/>
+            <a:p>
+              <a:pPr algn="ctr"/>
+              <a:r>
+                <a:rPr lang="en-US" sz="1200" dirty="0"/>
+                <a:t>timestep &lt;= maxTimeSteps</a:t>
+              </a:r>
+            </a:p>
+          </p:txBody>
+        </p:sp>
+        <p:cxnSp>
+          <p:nvCxnSpPr>
+            <p:cNvPr id="8" name="Straight Arrow Connector 7">
+              <a:extLst>
+                <a:ext uri="{FF2B5EF4-FFF2-40B4-BE49-F238E27FC236}">
+                  <a16:creationId xmlns:a16="http://schemas.microsoft.com/office/drawing/2014/main" id="{2FB3F2A4-16BD-4954-96F1-2BEE6D03EC3F}"/>
+                </a:ext>
+              </a:extLst>
+            </p:cNvPr>
+            <p:cNvCxnSpPr>
+              <a:stCxn id="5" idx="2"/>
+              <a:endCxn id="6" idx="0"/>
+            </p:cNvCxnSpPr>
+            <p:nvPr/>
+          </p:nvCxnSpPr>
+          <p:spPr>
+            <a:xfrm>
+              <a:off x="5428648" y="1399298"/>
+              <a:ext cx="1" cy="262701"/>
+            </a:xfrm>
+            <a:prstGeom prst="straightConnector1">
+              <a:avLst/>
+            </a:prstGeom>
+            <a:ln w="15875">
+              <a:solidFill>
+                <a:schemeClr val="bg1">
+                  <a:lumMod val="65000"/>
+                </a:schemeClr>
+              </a:solidFill>
+              <a:tailEnd type="triangle"/>
+            </a:ln>
+          </p:spPr>
+          <p:style>
+            <a:lnRef idx="1">
+              <a:schemeClr val="accent1"/>
+            </a:lnRef>
+            <a:fillRef idx="0">
+              <a:schemeClr val="accent1"/>
+            </a:fillRef>
+            <a:effectRef idx="0">
+              <a:schemeClr val="accent1"/>
+            </a:effectRef>
+            <a:fontRef idx="minor">
+              <a:schemeClr val="tx1"/>
+            </a:fontRef>
+          </p:style>
+        </p:cxnSp>
+        <p:cxnSp>
+          <p:nvCxnSpPr>
+            <p:cNvPr id="9" name="Straight Arrow Connector 8">
+              <a:extLst>
+                <a:ext uri="{FF2B5EF4-FFF2-40B4-BE49-F238E27FC236}">
+                  <a16:creationId xmlns:a16="http://schemas.microsoft.com/office/drawing/2014/main" id="{FEAA8C3B-4B17-478F-8D6A-71E630BCDBE1}"/>
+                </a:ext>
+              </a:extLst>
+            </p:cNvPr>
+            <p:cNvCxnSpPr>
+              <a:cxnSpLocks/>
+              <a:stCxn id="6" idx="2"/>
+              <a:endCxn id="4" idx="0"/>
+            </p:cNvCxnSpPr>
+            <p:nvPr/>
+          </p:nvCxnSpPr>
+          <p:spPr>
+            <a:xfrm>
+              <a:off x="5428649" y="2579078"/>
+              <a:ext cx="1" cy="323027"/>
+            </a:xfrm>
+            <a:prstGeom prst="straightConnector1">
+              <a:avLst/>
+            </a:prstGeom>
+            <a:ln w="15875">
+              <a:solidFill>
+                <a:schemeClr val="bg1">
+                  <a:lumMod val="65000"/>
+                </a:schemeClr>
+              </a:solidFill>
+              <a:tailEnd type="triangle"/>
+            </a:ln>
+          </p:spPr>
+          <p:style>
+            <a:lnRef idx="1">
+              <a:schemeClr val="accent1"/>
+            </a:lnRef>
+            <a:fillRef idx="0">
+              <a:schemeClr val="accent1"/>
+            </a:fillRef>
+            <a:effectRef idx="0">
+              <a:schemeClr val="accent1"/>
+            </a:effectRef>
+            <a:fontRef idx="minor">
+              <a:schemeClr val="tx1"/>
+            </a:fontRef>
+          </p:style>
+        </p:cxnSp>
+        <p:sp>
+          <p:nvSpPr>
+            <p:cNvPr id="14" name="Rectangle 13">
+              <a:extLst>
+                <a:ext uri="{FF2B5EF4-FFF2-40B4-BE49-F238E27FC236}">
+                  <a16:creationId xmlns:a16="http://schemas.microsoft.com/office/drawing/2014/main" id="{29DC1D85-00B2-4F8D-A4C5-033DC1639502}"/>
+                </a:ext>
+              </a:extLst>
+            </p:cNvPr>
+            <p:cNvSpPr/>
+            <p:nvPr/>
+          </p:nvSpPr>
+          <p:spPr>
+            <a:xfrm>
+              <a:off x="7734603" y="3804009"/>
+              <a:ext cx="2130641" cy="523220"/>
+            </a:xfrm>
+            <a:prstGeom prst="rect">
+              <a:avLst/>
+            </a:prstGeom>
+            <a:ln w="25400"/>
+          </p:spPr>
+          <p:style>
+            <a:lnRef idx="2">
+              <a:schemeClr val="accent5"/>
+            </a:lnRef>
+            <a:fillRef idx="1">
+              <a:schemeClr val="lt1"/>
+            </a:fillRef>
+            <a:effectRef idx="0">
+              <a:schemeClr val="accent5"/>
+            </a:effectRef>
+            <a:fontRef idx="minor">
+              <a:schemeClr val="dk1"/>
+            </a:fontRef>
+          </p:style>
+          <p:txBody>
+            <a:bodyPr rtlCol="0" anchor="ctr">
+              <a:spAutoFit/>
+            </a:bodyPr>
+            <a:lstStyle/>
+            <a:p>
+              <a:pPr algn="ctr"/>
+              <a:r>
+                <a:rPr lang="en-US" sz="1400" dirty="0"/>
+                <a:t>New events = Execute Event</a:t>
+              </a:r>
+            </a:p>
+          </p:txBody>
+        </p:sp>
+        <p:sp>
+          <p:nvSpPr>
+            <p:cNvPr id="15" name="Diamond 14">
+              <a:extLst>
+                <a:ext uri="{FF2B5EF4-FFF2-40B4-BE49-F238E27FC236}">
+                  <a16:creationId xmlns:a16="http://schemas.microsoft.com/office/drawing/2014/main" id="{F4A36C0F-1496-41FC-9CCF-3D20EFF4A6A3}"/>
+                </a:ext>
+              </a:extLst>
+            </p:cNvPr>
+            <p:cNvSpPr/>
+            <p:nvPr/>
+          </p:nvSpPr>
+          <p:spPr>
+            <a:xfrm>
+              <a:off x="4306430" y="3607079"/>
+              <a:ext cx="2244437" cy="917079"/>
+            </a:xfrm>
+            <a:prstGeom prst="diamond">
+              <a:avLst/>
+            </a:prstGeom>
+            <a:solidFill>
+              <a:schemeClr val="tx1"/>
+            </a:solidFill>
+          </p:spPr>
+          <p:style>
+            <a:lnRef idx="2">
+              <a:schemeClr val="accent1">
+                <a:shade val="50000"/>
+              </a:schemeClr>
+            </a:lnRef>
+            <a:fillRef idx="1">
+              <a:schemeClr val="accent1"/>
+            </a:fillRef>
+            <a:effectRef idx="0">
+              <a:schemeClr val="accent1"/>
+            </a:effectRef>
+            <a:fontRef idx="minor">
+              <a:schemeClr val="lt1"/>
+            </a:fontRef>
+          </p:style>
+          <p:txBody>
+            <a:bodyPr rtlCol="0" anchor="ctr">
+              <a:spAutoFit/>
+            </a:bodyPr>
+            <a:lstStyle/>
+            <a:p>
+              <a:pPr algn="ctr"/>
+              <a:r>
+                <a:rPr lang="en-US" sz="1200" dirty="0"/>
+                <a:t>has Event in the timeStep?</a:t>
+              </a:r>
+            </a:p>
+          </p:txBody>
+        </p:sp>
+        <p:sp>
+          <p:nvSpPr>
+            <p:cNvPr id="16" name="Rectangle 15">
+              <a:extLst>
+                <a:ext uri="{FF2B5EF4-FFF2-40B4-BE49-F238E27FC236}">
+                  <a16:creationId xmlns:a16="http://schemas.microsoft.com/office/drawing/2014/main" id="{33916920-127E-459B-A810-29637E536FCA}"/>
+                </a:ext>
+              </a:extLst>
+            </p:cNvPr>
+            <p:cNvSpPr/>
+            <p:nvPr/>
+          </p:nvSpPr>
+          <p:spPr>
+            <a:xfrm>
+              <a:off x="7734603" y="4742366"/>
+              <a:ext cx="2130641" cy="523220"/>
+            </a:xfrm>
+            <a:prstGeom prst="rect">
+              <a:avLst/>
+            </a:prstGeom>
+            <a:ln w="25400"/>
+          </p:spPr>
+          <p:style>
+            <a:lnRef idx="2">
+              <a:schemeClr val="accent5"/>
+            </a:lnRef>
+            <a:fillRef idx="1">
+              <a:schemeClr val="lt1"/>
+            </a:fillRef>
+            <a:effectRef idx="0">
+              <a:schemeClr val="accent5"/>
+            </a:effectRef>
+            <a:fontRef idx="minor">
+              <a:schemeClr val="dk1"/>
+            </a:fontRef>
+          </p:style>
+          <p:txBody>
+            <a:bodyPr rtlCol="0" anchor="ctr">
+              <a:spAutoFit/>
+            </a:bodyPr>
+            <a:lstStyle/>
+            <a:p>
+              <a:pPr algn="ctr"/>
+              <a:r>
+                <a:rPr lang="en-US" sz="1400" dirty="0"/>
+                <a:t>Add new events to the event queue</a:t>
+              </a:r>
+            </a:p>
+          </p:txBody>
+        </p:sp>
+        <p:cxnSp>
+          <p:nvCxnSpPr>
+            <p:cNvPr id="17" name="Straight Arrow Connector 16">
+              <a:extLst>
+                <a:ext uri="{FF2B5EF4-FFF2-40B4-BE49-F238E27FC236}">
+                  <a16:creationId xmlns:a16="http://schemas.microsoft.com/office/drawing/2014/main" id="{B9C56F44-6FB1-48CD-8900-43DD909B0AB2}"/>
+                </a:ext>
+              </a:extLst>
+            </p:cNvPr>
+            <p:cNvCxnSpPr>
+              <a:cxnSpLocks/>
+              <a:stCxn id="15" idx="3"/>
+              <a:endCxn id="14" idx="1"/>
+            </p:cNvCxnSpPr>
+            <p:nvPr/>
+          </p:nvCxnSpPr>
+          <p:spPr>
+            <a:xfrm>
+              <a:off x="6550867" y="4065619"/>
+              <a:ext cx="1183736" cy="0"/>
+            </a:xfrm>
+            <a:prstGeom prst="straightConnector1">
+              <a:avLst/>
+            </a:prstGeom>
+            <a:ln w="15875">
+              <a:solidFill>
+                <a:schemeClr val="bg1">
+                  <a:lumMod val="65000"/>
+                </a:schemeClr>
+              </a:solidFill>
+              <a:tailEnd type="triangle"/>
+            </a:ln>
+          </p:spPr>
+          <p:style>
+            <a:lnRef idx="1">
+              <a:schemeClr val="accent1"/>
+            </a:lnRef>
+            <a:fillRef idx="0">
+              <a:schemeClr val="accent1"/>
+            </a:fillRef>
+            <a:effectRef idx="0">
+              <a:schemeClr val="accent1"/>
+            </a:effectRef>
+            <a:fontRef idx="minor">
+              <a:schemeClr val="tx1"/>
+            </a:fontRef>
+          </p:style>
+        </p:cxnSp>
+        <p:cxnSp>
+          <p:nvCxnSpPr>
+            <p:cNvPr id="20" name="Straight Arrow Connector 19">
+              <a:extLst>
+                <a:ext uri="{FF2B5EF4-FFF2-40B4-BE49-F238E27FC236}">
+                  <a16:creationId xmlns:a16="http://schemas.microsoft.com/office/drawing/2014/main" id="{0501DBE1-DB82-4041-B4B4-AEB1E3333E99}"/>
+                </a:ext>
+              </a:extLst>
+            </p:cNvPr>
+            <p:cNvCxnSpPr>
+              <a:cxnSpLocks/>
+              <a:stCxn id="14" idx="2"/>
+              <a:endCxn id="16" idx="0"/>
+            </p:cNvCxnSpPr>
+            <p:nvPr/>
+          </p:nvCxnSpPr>
+          <p:spPr>
+            <a:xfrm>
+              <a:off x="8799924" y="4327229"/>
+              <a:ext cx="0" cy="415137"/>
+            </a:xfrm>
+            <a:prstGeom prst="straightConnector1">
+              <a:avLst/>
+            </a:prstGeom>
+            <a:ln w="15875">
+              <a:solidFill>
+                <a:schemeClr val="bg1">
+                  <a:lumMod val="65000"/>
+                </a:schemeClr>
+              </a:solidFill>
+              <a:tailEnd type="triangle"/>
+            </a:ln>
+          </p:spPr>
+          <p:style>
+            <a:lnRef idx="1">
+              <a:schemeClr val="accent1"/>
+            </a:lnRef>
+            <a:fillRef idx="0">
+              <a:schemeClr val="accent1"/>
+            </a:fillRef>
+            <a:effectRef idx="0">
+              <a:schemeClr val="accent1"/>
+            </a:effectRef>
+            <a:fontRef idx="minor">
+              <a:schemeClr val="tx1"/>
+            </a:fontRef>
+          </p:style>
+        </p:cxnSp>
+        <p:cxnSp>
+          <p:nvCxnSpPr>
+            <p:cNvPr id="23" name="Straight Arrow Connector 22">
+              <a:extLst>
+                <a:ext uri="{FF2B5EF4-FFF2-40B4-BE49-F238E27FC236}">
+                  <a16:creationId xmlns:a16="http://schemas.microsoft.com/office/drawing/2014/main" id="{A6457F47-8150-4FB9-9DA0-12CCF4AFBEA3}"/>
+                </a:ext>
+              </a:extLst>
+            </p:cNvPr>
+            <p:cNvCxnSpPr>
+              <a:cxnSpLocks/>
+              <a:stCxn id="4" idx="2"/>
+              <a:endCxn id="15" idx="0"/>
+            </p:cNvCxnSpPr>
+            <p:nvPr/>
+          </p:nvCxnSpPr>
+          <p:spPr>
+            <a:xfrm flipH="1">
+              <a:off x="5428649" y="3425325"/>
+              <a:ext cx="1" cy="181754"/>
+            </a:xfrm>
+            <a:prstGeom prst="straightConnector1">
+              <a:avLst/>
+            </a:prstGeom>
+            <a:ln w="15875">
+              <a:solidFill>
+                <a:schemeClr val="bg1">
+                  <a:lumMod val="65000"/>
+                </a:schemeClr>
+              </a:solidFill>
+              <a:tailEnd type="triangle"/>
+            </a:ln>
+          </p:spPr>
+          <p:style>
+            <a:lnRef idx="1">
+              <a:schemeClr val="accent1"/>
+            </a:lnRef>
+            <a:fillRef idx="0">
+              <a:schemeClr val="accent1"/>
+            </a:fillRef>
+            <a:effectRef idx="0">
+              <a:schemeClr val="accent1"/>
+            </a:effectRef>
+            <a:fontRef idx="minor">
+              <a:schemeClr val="tx1"/>
+            </a:fontRef>
+          </p:style>
+        </p:cxnSp>
+        <p:cxnSp>
+          <p:nvCxnSpPr>
+            <p:cNvPr id="29" name="Connector: Elbow 28">
+              <a:extLst>
+                <a:ext uri="{FF2B5EF4-FFF2-40B4-BE49-F238E27FC236}">
+                  <a16:creationId xmlns:a16="http://schemas.microsoft.com/office/drawing/2014/main" id="{1ABA5B33-75EF-440C-A4F9-927672F87975}"/>
+                </a:ext>
+              </a:extLst>
+            </p:cNvPr>
+            <p:cNvCxnSpPr>
+              <a:stCxn id="16" idx="2"/>
+              <a:endCxn id="15" idx="2"/>
+            </p:cNvCxnSpPr>
+            <p:nvPr/>
+          </p:nvCxnSpPr>
+          <p:spPr>
+            <a:xfrm rot="5400000" flipH="1">
+              <a:off x="6743573" y="3209235"/>
+              <a:ext cx="741428" cy="3371275"/>
+            </a:xfrm>
+            <a:prstGeom prst="bentConnector3">
+              <a:avLst>
+                <a:gd name="adj1" fmla="val -30832"/>
+              </a:avLst>
+            </a:prstGeom>
+            <a:ln w="15875">
+              <a:solidFill>
+                <a:schemeClr val="bg1">
+                  <a:lumMod val="65000"/>
+                </a:schemeClr>
+              </a:solidFill>
+              <a:tailEnd type="triangle"/>
+            </a:ln>
+          </p:spPr>
+          <p:style>
+            <a:lnRef idx="1">
+              <a:schemeClr val="accent1"/>
+            </a:lnRef>
+            <a:fillRef idx="0">
+              <a:schemeClr val="accent1"/>
+            </a:fillRef>
+            <a:effectRef idx="0">
+              <a:schemeClr val="accent1"/>
+            </a:effectRef>
+            <a:fontRef idx="minor">
+              <a:schemeClr val="tx1"/>
+            </a:fontRef>
+          </p:style>
+        </p:cxnSp>
+        <p:sp>
+          <p:nvSpPr>
+            <p:cNvPr id="32" name="Rectangle 31">
+              <a:extLst>
+                <a:ext uri="{FF2B5EF4-FFF2-40B4-BE49-F238E27FC236}">
+                  <a16:creationId xmlns:a16="http://schemas.microsoft.com/office/drawing/2014/main" id="{EF4F4D2A-EDE2-4EE9-B820-9188C423F4F6}"/>
+                </a:ext>
+              </a:extLst>
+            </p:cNvPr>
+            <p:cNvSpPr/>
+            <p:nvPr/>
+          </p:nvSpPr>
+          <p:spPr>
+            <a:xfrm>
+              <a:off x="1341440" y="3799246"/>
+              <a:ext cx="2130641" cy="523220"/>
+            </a:xfrm>
+            <a:prstGeom prst="rect">
+              <a:avLst/>
+            </a:prstGeom>
+            <a:ln w="25400"/>
+          </p:spPr>
+          <p:style>
+            <a:lnRef idx="2">
+              <a:schemeClr val="accent5"/>
+            </a:lnRef>
+            <a:fillRef idx="1">
+              <a:schemeClr val="lt1"/>
+            </a:fillRef>
+            <a:effectRef idx="0">
+              <a:schemeClr val="accent5"/>
+            </a:effectRef>
+            <a:fontRef idx="minor">
+              <a:schemeClr val="dk1"/>
+            </a:fontRef>
+          </p:style>
+          <p:txBody>
+            <a:bodyPr rtlCol="0" anchor="ctr">
+              <a:spAutoFit/>
+            </a:bodyPr>
+            <a:lstStyle/>
+            <a:p>
+              <a:pPr algn="ctr"/>
+              <a:r>
+                <a:rPr lang="en-US" sz="1400" dirty="0"/>
+                <a:t>notifyClients (creates packet events)</a:t>
+              </a:r>
+            </a:p>
+          </p:txBody>
+        </p:sp>
+        <p:sp>
+          <p:nvSpPr>
+            <p:cNvPr id="33" name="Rectangle 32">
+              <a:extLst>
+                <a:ext uri="{FF2B5EF4-FFF2-40B4-BE49-F238E27FC236}">
+                  <a16:creationId xmlns:a16="http://schemas.microsoft.com/office/drawing/2014/main" id="{563262CB-A687-4E79-A590-53A59E09A07E}"/>
+                </a:ext>
+              </a:extLst>
+            </p:cNvPr>
+            <p:cNvSpPr/>
+            <p:nvPr/>
+          </p:nvSpPr>
+          <p:spPr>
+            <a:xfrm>
+              <a:off x="1341440" y="4634644"/>
+              <a:ext cx="2130641" cy="738664"/>
+            </a:xfrm>
+            <a:prstGeom prst="rect">
+              <a:avLst/>
+            </a:prstGeom>
+            <a:ln w="25400"/>
+          </p:spPr>
+          <p:style>
+            <a:lnRef idx="2">
+              <a:schemeClr val="accent5"/>
+            </a:lnRef>
+            <a:fillRef idx="1">
+              <a:schemeClr val="lt1"/>
+            </a:fillRef>
+            <a:effectRef idx="0">
+              <a:schemeClr val="accent5"/>
+            </a:effectRef>
+            <a:fontRef idx="minor">
+              <a:schemeClr val="dk1"/>
+            </a:fontRef>
+          </p:style>
+          <p:txBody>
+            <a:bodyPr rtlCol="0" anchor="ctr">
+              <a:spAutoFit/>
+            </a:bodyPr>
+            <a:lstStyle/>
+            <a:p>
+              <a:pPr algn="ctr"/>
+              <a:r>
+                <a:rPr lang="en-US" sz="1400" dirty="0"/>
+                <a:t>Call onTimeStepEnd</a:t>
+              </a:r>
+            </a:p>
+            <a:p>
+              <a:pPr algn="ctr"/>
+              <a:r>
+                <a:rPr lang="en-US" sz="1400" dirty="0"/>
+                <a:t> of each node (collect stats)</a:t>
+              </a:r>
+            </a:p>
+          </p:txBody>
+        </p:sp>
+        <p:cxnSp>
+          <p:nvCxnSpPr>
+            <p:cNvPr id="34" name="Straight Arrow Connector 33">
+              <a:extLst>
+                <a:ext uri="{FF2B5EF4-FFF2-40B4-BE49-F238E27FC236}">
+                  <a16:creationId xmlns:a16="http://schemas.microsoft.com/office/drawing/2014/main" id="{F8D7506F-57D7-4D67-B6B6-DFE6EF93DE64}"/>
+                </a:ext>
+              </a:extLst>
+            </p:cNvPr>
+            <p:cNvCxnSpPr>
+              <a:cxnSpLocks/>
+              <a:stCxn id="32" idx="2"/>
+              <a:endCxn id="33" idx="0"/>
+            </p:cNvCxnSpPr>
+            <p:nvPr/>
+          </p:nvCxnSpPr>
+          <p:spPr>
+            <a:xfrm>
+              <a:off x="2406761" y="4322466"/>
+              <a:ext cx="0" cy="312178"/>
+            </a:xfrm>
+            <a:prstGeom prst="straightConnector1">
+              <a:avLst/>
+            </a:prstGeom>
+            <a:ln w="15875">
+              <a:solidFill>
+                <a:schemeClr val="bg1">
+                  <a:lumMod val="65000"/>
+                </a:schemeClr>
+              </a:solidFill>
+              <a:tailEnd type="triangle"/>
+            </a:ln>
+          </p:spPr>
+          <p:style>
+            <a:lnRef idx="1">
+              <a:schemeClr val="accent1"/>
+            </a:lnRef>
+            <a:fillRef idx="0">
+              <a:schemeClr val="accent1"/>
+            </a:fillRef>
+            <a:effectRef idx="0">
+              <a:schemeClr val="accent1"/>
+            </a:effectRef>
+            <a:fontRef idx="minor">
+              <a:schemeClr val="tx1"/>
+            </a:fontRef>
+          </p:style>
+        </p:cxnSp>
+        <p:sp>
+          <p:nvSpPr>
+            <p:cNvPr id="37" name="TextBox 36">
+              <a:extLst>
+                <a:ext uri="{FF2B5EF4-FFF2-40B4-BE49-F238E27FC236}">
+                  <a16:creationId xmlns:a16="http://schemas.microsoft.com/office/drawing/2014/main" id="{18449B06-8B39-45E7-9D10-BED1F1B33121}"/>
+                </a:ext>
+              </a:extLst>
+            </p:cNvPr>
+            <p:cNvSpPr txBox="1"/>
+            <p:nvPr/>
+          </p:nvSpPr>
+          <p:spPr>
+            <a:xfrm>
+              <a:off x="6784065" y="3782688"/>
+              <a:ext cx="369454" cy="307777"/>
+            </a:xfrm>
+            <a:prstGeom prst="rect">
+              <a:avLst/>
+            </a:prstGeom>
+            <a:noFill/>
+          </p:spPr>
+          <p:txBody>
+            <a:bodyPr wrap="square" rtlCol="0">
+              <a:spAutoFit/>
+            </a:bodyPr>
+            <a:lstStyle/>
+            <a:p>
+              <a:r>
+                <a:rPr lang="en-US" sz="1400" i="1" dirty="0"/>
+                <a:t>Y</a:t>
+              </a:r>
+            </a:p>
+          </p:txBody>
+        </p:sp>
+        <p:sp>
+          <p:nvSpPr>
+            <p:cNvPr id="38" name="TextBox 37">
+              <a:extLst>
+                <a:ext uri="{FF2B5EF4-FFF2-40B4-BE49-F238E27FC236}">
+                  <a16:creationId xmlns:a16="http://schemas.microsoft.com/office/drawing/2014/main" id="{5B950F1B-0CB8-4A69-9213-DC7044CDBDC1}"/>
+                </a:ext>
+              </a:extLst>
+            </p:cNvPr>
+            <p:cNvSpPr txBox="1"/>
+            <p:nvPr/>
+          </p:nvSpPr>
+          <p:spPr>
+            <a:xfrm>
+              <a:off x="3498819" y="3782688"/>
+              <a:ext cx="369454" cy="307777"/>
+            </a:xfrm>
+            <a:prstGeom prst="rect">
+              <a:avLst/>
+            </a:prstGeom>
+            <a:noFill/>
+          </p:spPr>
+          <p:txBody>
+            <a:bodyPr wrap="square" rtlCol="0">
+              <a:spAutoFit/>
+            </a:bodyPr>
+            <a:lstStyle/>
+            <a:p>
+              <a:r>
+                <a:rPr lang="en-US" sz="1400" i="1" dirty="0"/>
+                <a:t>N</a:t>
+              </a:r>
+            </a:p>
+          </p:txBody>
+        </p:sp>
+        <p:cxnSp>
+          <p:nvCxnSpPr>
+            <p:cNvPr id="43" name="Straight Arrow Connector 42">
+              <a:extLst>
+                <a:ext uri="{FF2B5EF4-FFF2-40B4-BE49-F238E27FC236}">
+                  <a16:creationId xmlns:a16="http://schemas.microsoft.com/office/drawing/2014/main" id="{35D2616F-07F4-458E-9362-5ADCFC8516A2}"/>
+                </a:ext>
+              </a:extLst>
+            </p:cNvPr>
+            <p:cNvCxnSpPr>
+              <a:cxnSpLocks/>
+              <a:stCxn id="15" idx="1"/>
+              <a:endCxn id="32" idx="3"/>
+            </p:cNvCxnSpPr>
+            <p:nvPr/>
+          </p:nvCxnSpPr>
+          <p:spPr>
+            <a:xfrm flipH="1" flipV="1">
+              <a:off x="3472081" y="4060856"/>
+              <a:ext cx="834349" cy="4763"/>
+            </a:xfrm>
+            <a:prstGeom prst="straightConnector1">
+              <a:avLst/>
+            </a:prstGeom>
+            <a:ln w="15875">
+              <a:solidFill>
+                <a:schemeClr val="bg1">
+                  <a:lumMod val="65000"/>
+                </a:schemeClr>
+              </a:solidFill>
+              <a:tailEnd type="triangle"/>
+            </a:ln>
+          </p:spPr>
+          <p:style>
+            <a:lnRef idx="1">
+              <a:schemeClr val="accent1"/>
+            </a:lnRef>
+            <a:fillRef idx="0">
+              <a:schemeClr val="accent1"/>
+            </a:fillRef>
+            <a:effectRef idx="0">
+              <a:schemeClr val="accent1"/>
+            </a:effectRef>
+            <a:fontRef idx="minor">
+              <a:schemeClr val="tx1"/>
+            </a:fontRef>
+          </p:style>
+        </p:cxnSp>
+        <p:cxnSp>
+          <p:nvCxnSpPr>
+            <p:cNvPr id="55" name="Connector: Elbow 54">
+              <a:extLst>
+                <a:ext uri="{FF2B5EF4-FFF2-40B4-BE49-F238E27FC236}">
+                  <a16:creationId xmlns:a16="http://schemas.microsoft.com/office/drawing/2014/main" id="{936E07E4-2B47-4E1A-9C52-A8FDDC648C34}"/>
+                </a:ext>
+              </a:extLst>
+            </p:cNvPr>
+            <p:cNvCxnSpPr>
+              <a:cxnSpLocks/>
+              <a:stCxn id="56" idx="2"/>
+              <a:endCxn id="6" idx="1"/>
+            </p:cNvCxnSpPr>
+            <p:nvPr/>
+          </p:nvCxnSpPr>
+          <p:spPr>
+            <a:xfrm rot="5400000" flipH="1" flipV="1">
+              <a:off x="1437798" y="3089501"/>
+              <a:ext cx="3837593" cy="1899670"/>
+            </a:xfrm>
+            <a:prstGeom prst="bentConnector4">
+              <a:avLst>
+                <a:gd name="adj1" fmla="val -5957"/>
+                <a:gd name="adj2" fmla="val -83868"/>
+              </a:avLst>
+            </a:prstGeom>
+            <a:ln w="15875">
+              <a:solidFill>
+                <a:schemeClr val="bg1">
+                  <a:lumMod val="65000"/>
+                </a:schemeClr>
+              </a:solidFill>
+              <a:tailEnd type="triangle"/>
+            </a:ln>
+          </p:spPr>
+          <p:style>
+            <a:lnRef idx="1">
+              <a:schemeClr val="accent1"/>
+            </a:lnRef>
+            <a:fillRef idx="0">
+              <a:schemeClr val="accent1"/>
+            </a:fillRef>
+            <a:effectRef idx="0">
+              <a:schemeClr val="accent1"/>
+            </a:effectRef>
+            <a:fontRef idx="minor">
+              <a:schemeClr val="tx1"/>
+            </a:fontRef>
+          </p:style>
+        </p:cxnSp>
+        <p:sp>
+          <p:nvSpPr>
+            <p:cNvPr id="56" name="Rectangle 55">
+              <a:extLst>
+                <a:ext uri="{FF2B5EF4-FFF2-40B4-BE49-F238E27FC236}">
+                  <a16:creationId xmlns:a16="http://schemas.microsoft.com/office/drawing/2014/main" id="{6801123E-5D90-4B08-B99C-B1C0B97162E4}"/>
+                </a:ext>
+              </a:extLst>
+            </p:cNvPr>
+            <p:cNvSpPr/>
+            <p:nvPr/>
+          </p:nvSpPr>
+          <p:spPr>
+            <a:xfrm>
+              <a:off x="1341439" y="5650355"/>
+              <a:ext cx="2130641" cy="307777"/>
+            </a:xfrm>
+            <a:prstGeom prst="rect">
+              <a:avLst/>
+            </a:prstGeom>
+            <a:ln w="25400"/>
+          </p:spPr>
+          <p:style>
+            <a:lnRef idx="2">
+              <a:schemeClr val="accent5"/>
+            </a:lnRef>
+            <a:fillRef idx="1">
+              <a:schemeClr val="lt1"/>
+            </a:fillRef>
+            <a:effectRef idx="0">
+              <a:schemeClr val="accent5"/>
+            </a:effectRef>
+            <a:fontRef idx="minor">
+              <a:schemeClr val="dk1"/>
+            </a:fontRef>
+          </p:style>
+          <p:txBody>
+            <a:bodyPr rtlCol="0" anchor="ctr">
+              <a:spAutoFit/>
+            </a:bodyPr>
+            <a:lstStyle/>
+            <a:p>
+              <a:pPr algn="ctr"/>
+              <a:r>
+                <a:rPr lang="en-US" sz="1400" dirty="0"/>
+                <a:t>timeStep++</a:t>
+              </a:r>
+            </a:p>
+          </p:txBody>
+        </p:sp>
+        <p:sp>
+          <p:nvSpPr>
+            <p:cNvPr id="61" name="Rectangle: Rounded Corners 60">
+              <a:extLst>
+                <a:ext uri="{FF2B5EF4-FFF2-40B4-BE49-F238E27FC236}">
+                  <a16:creationId xmlns:a16="http://schemas.microsoft.com/office/drawing/2014/main" id="{1C8CCD83-54FB-4209-87DB-03C824CF004B}"/>
+                </a:ext>
+              </a:extLst>
+            </p:cNvPr>
+            <p:cNvSpPr/>
+            <p:nvPr/>
+          </p:nvSpPr>
+          <p:spPr>
+            <a:xfrm>
+              <a:off x="8423799" y="1964521"/>
+              <a:ext cx="790113" cy="328474"/>
+            </a:xfrm>
+            <a:prstGeom prst="roundRect">
+              <a:avLst/>
+            </a:prstGeom>
+          </p:spPr>
+          <p:style>
+            <a:lnRef idx="2">
+              <a:schemeClr val="accent3">
+                <a:shade val="50000"/>
+              </a:schemeClr>
+            </a:lnRef>
+            <a:fillRef idx="1">
+              <a:schemeClr val="accent3"/>
+            </a:fillRef>
+            <a:effectRef idx="0">
+              <a:schemeClr val="accent3"/>
+            </a:effectRef>
+            <a:fontRef idx="minor">
+              <a:schemeClr val="lt1"/>
+            </a:fontRef>
+          </p:style>
+          <p:txBody>
+            <a:bodyPr rtlCol="0" anchor="ctr"/>
+            <a:lstStyle/>
+            <a:p>
+              <a:pPr algn="ctr"/>
+              <a:r>
+                <a:rPr lang="en-US" dirty="0"/>
+                <a:t>End</a:t>
+              </a:r>
+            </a:p>
+          </p:txBody>
+        </p:sp>
+        <p:cxnSp>
+          <p:nvCxnSpPr>
+            <p:cNvPr id="62" name="Straight Arrow Connector 61">
+              <a:extLst>
+                <a:ext uri="{FF2B5EF4-FFF2-40B4-BE49-F238E27FC236}">
+                  <a16:creationId xmlns:a16="http://schemas.microsoft.com/office/drawing/2014/main" id="{B56EFC8C-F46B-4574-8293-4672DA5FA41E}"/>
+                </a:ext>
+              </a:extLst>
+            </p:cNvPr>
+            <p:cNvCxnSpPr>
+              <a:cxnSpLocks/>
+              <a:stCxn id="6" idx="3"/>
+              <a:endCxn id="61" idx="1"/>
+            </p:cNvCxnSpPr>
+            <p:nvPr/>
+          </p:nvCxnSpPr>
+          <p:spPr>
+            <a:xfrm>
+              <a:off x="6550867" y="2120539"/>
+              <a:ext cx="1872932" cy="8219"/>
+            </a:xfrm>
+            <a:prstGeom prst="straightConnector1">
+              <a:avLst/>
+            </a:prstGeom>
+            <a:ln w="15875">
+              <a:solidFill>
+                <a:schemeClr val="bg1">
+                  <a:lumMod val="65000"/>
+                </a:schemeClr>
+              </a:solidFill>
+              <a:tailEnd type="triangle"/>
+            </a:ln>
+          </p:spPr>
+          <p:style>
+            <a:lnRef idx="1">
+              <a:schemeClr val="accent1"/>
+            </a:lnRef>
+            <a:fillRef idx="0">
+              <a:schemeClr val="accent1"/>
+            </a:fillRef>
+            <a:effectRef idx="0">
+              <a:schemeClr val="accent1"/>
+            </a:effectRef>
+            <a:fontRef idx="minor">
+              <a:schemeClr val="tx1"/>
+            </a:fontRef>
+          </p:style>
+        </p:cxnSp>
+        <p:cxnSp>
+          <p:nvCxnSpPr>
+            <p:cNvPr id="66" name="Straight Arrow Connector 65">
+              <a:extLst>
+                <a:ext uri="{FF2B5EF4-FFF2-40B4-BE49-F238E27FC236}">
+                  <a16:creationId xmlns:a16="http://schemas.microsoft.com/office/drawing/2014/main" id="{97464677-1B51-4EEE-8284-9B04CB864546}"/>
+                </a:ext>
+              </a:extLst>
+            </p:cNvPr>
+            <p:cNvCxnSpPr>
+              <a:cxnSpLocks/>
+              <a:stCxn id="33" idx="2"/>
+              <a:endCxn id="56" idx="0"/>
+            </p:cNvCxnSpPr>
+            <p:nvPr/>
+          </p:nvCxnSpPr>
+          <p:spPr>
+            <a:xfrm flipH="1">
+              <a:off x="2406760" y="5373308"/>
+              <a:ext cx="1" cy="277047"/>
+            </a:xfrm>
+            <a:prstGeom prst="straightConnector1">
+              <a:avLst/>
+            </a:prstGeom>
+            <a:ln w="15875">
+              <a:solidFill>
+                <a:schemeClr val="bg1">
+                  <a:lumMod val="65000"/>
+                </a:schemeClr>
+              </a:solidFill>
+              <a:tailEnd type="triangle"/>
+            </a:ln>
+          </p:spPr>
+          <p:style>
+            <a:lnRef idx="1">
+              <a:schemeClr val="accent1"/>
+            </a:lnRef>
+            <a:fillRef idx="0">
+              <a:schemeClr val="accent1"/>
+            </a:fillRef>
+            <a:effectRef idx="0">
+              <a:schemeClr val="accent1"/>
+            </a:effectRef>
+            <a:fontRef idx="minor">
+              <a:schemeClr val="tx1"/>
+            </a:fontRef>
+          </p:style>
+        </p:cxnSp>
+      </p:grpSp>
+    </p:spTree>
+    <p:extLst>
+      <p:ext uri="{BB962C8B-B14F-4D97-AF65-F5344CB8AC3E}">
+        <p14:creationId xmlns:p14="http://schemas.microsoft.com/office/powerpoint/2010/main" val="1985630931"/>
+      </p:ext>
+    </p:extLst>
+  </p:cSld>
+  <p:clrMapOvr>
+    <a:masterClrMapping/>
+  </p:clrMapOvr>
+</p:sld>
+</file>
+
+<file path=ppt/slides/slide33.xml><?xml version="1.0" encoding="utf-8"?>
+<p:sld xmlns:a="http://schemas.openxmlformats.org/drawingml/2006/main" xmlns:r="http://schemas.openxmlformats.org/officeDocument/2006/relationships" xmlns:p="http://schemas.openxmlformats.org/presentationml/2006/main">
+  <p:cSld>
+    <p:spTree>
+      <p:nvGrpSpPr>
+        <p:cNvPr id="1" name=""/>
+        <p:cNvGrpSpPr/>
+        <p:nvPr/>
+      </p:nvGrpSpPr>
+      <p:grpSpPr>
+        <a:xfrm>
+          <a:off x="0" y="0"/>
+          <a:ext cx="0" cy="0"/>
+          <a:chOff x="0" y="0"/>
+          <a:chExt cx="0" cy="0"/>
+        </a:xfrm>
+      </p:grpSpPr>
+      <p:sp>
+        <p:nvSpPr>
+          <p:cNvPr id="2" name="Title 1">
+            <a:extLst>
+              <a:ext uri="{FF2B5EF4-FFF2-40B4-BE49-F238E27FC236}">
+                <a16:creationId xmlns:a16="http://schemas.microsoft.com/office/drawing/2014/main" id="{D9522911-554A-4D10-87E6-C465F7CB88DF}"/>
+              </a:ext>
+            </a:extLst>
+          </p:cNvPr>
+          <p:cNvSpPr>
+            <a:spLocks noGrp="1"/>
+          </p:cNvSpPr>
+          <p:nvPr>
+            <p:ph type="title"/>
+          </p:nvPr>
+        </p:nvSpPr>
+        <p:spPr/>
+        <p:txBody>
+          <a:bodyPr/>
+          <a:lstStyle/>
+          <a:p>
+            <a:r>
+              <a:rPr lang="en-US" dirty="0" err="1"/>
+              <a:t>Algo</a:t>
+            </a:r>
+            <a:r>
+              <a:rPr lang="en-US" dirty="0"/>
+              <a:t> 1. policy cycle</a:t>
+            </a:r>
           </a:p>
         </p:txBody>
       </p:sp>
@@ -13794,16 +15038,57 @@
           <a:bodyPr/>
           <a:lstStyle/>
           <a:p>
+            <a:pPr marL="514350" indent="-514350">
+              <a:buAutoNum type="arabicPeriod"/>
+            </a:pPr>
             <a:r>
               <a:rPr lang="en-US" dirty="0"/>
-              <a:t>Start the node 1</a:t>
-            </a:r>
-          </a:p>
-          <a:p>
+              <a:t>Estimate </a:t>
+            </a:r>
+            <a:r>
+              <a:rPr lang="en-US" dirty="0" err="1"/>
+              <a:t>rtt</a:t>
+            </a:r>
+            <a:endParaRPr lang="en-US" dirty="0"/>
+          </a:p>
+          <a:p>
+            <a:pPr marL="514350" indent="-514350">
+              <a:buAutoNum type="arabicPeriod"/>
+            </a:pPr>
             <a:r>
               <a:rPr lang="en-US" dirty="0"/>
-              <a:t>Start node 2 after a while (1 sec)</a:t>
-            </a:r>
+              <a:t>Update policy</a:t>
+            </a:r>
+          </a:p>
+          <a:p>
+            <a:pPr marL="514350" indent="-514350">
+              <a:buAutoNum type="arabicPeriod"/>
+            </a:pPr>
+            <a:r>
+              <a:rPr lang="en-US" dirty="0"/>
+              <a:t>Wait 2rtt time</a:t>
+            </a:r>
+          </a:p>
+          <a:p>
+            <a:pPr marL="514350" indent="-514350">
+              <a:buAutoNum type="arabicPeriod"/>
+            </a:pPr>
+            <a:r>
+              <a:rPr lang="en-US" dirty="0"/>
+              <a:t>Go back to 1</a:t>
+            </a:r>
+          </a:p>
+          <a:p>
+            <a:pPr marL="514350" indent="-514350">
+              <a:buAutoNum type="arabicPeriod"/>
+            </a:pPr>
+            <a:endParaRPr lang="en-US" dirty="0"/>
+          </a:p>
+          <a:p>
+            <a:pPr marL="514350" indent="-514350">
+              <a:buAutoNum type="arabicPeriod"/>
+            </a:pPr>
+            <a:endParaRPr lang="en-US" dirty="0"/>
           </a:p>
         </p:txBody>
       </p:sp>
@@ -13811,6 +15096,259 @@
     <p:extLst>
       <p:ext uri="{BB962C8B-B14F-4D97-AF65-F5344CB8AC3E}">
         <p14:creationId xmlns:p14="http://schemas.microsoft.com/office/powerpoint/2010/main" val="1977121735"/>
+      </p:ext>
+    </p:extLst>
+  </p:cSld>
+  <p:clrMapOvr>
+    <a:masterClrMapping/>
+  </p:clrMapOvr>
+</p:sld>
+</file>
+
+<file path=ppt/slides/slide34.xml><?xml version="1.0" encoding="utf-8"?>
+<p:sld xmlns:a="http://schemas.openxmlformats.org/drawingml/2006/main" xmlns:r="http://schemas.openxmlformats.org/officeDocument/2006/relationships" xmlns:p="http://schemas.openxmlformats.org/presentationml/2006/main">
+  <p:cSld>
+    <p:spTree>
+      <p:nvGrpSpPr>
+        <p:cNvPr id="1" name=""/>
+        <p:cNvGrpSpPr/>
+        <p:nvPr/>
+      </p:nvGrpSpPr>
+      <p:grpSpPr>
+        <a:xfrm>
+          <a:off x="0" y="0"/>
+          <a:ext cx="0" cy="0"/>
+          <a:chOff x="0" y="0"/>
+          <a:chExt cx="0" cy="0"/>
+        </a:xfrm>
+      </p:grpSpPr>
+      <p:sp>
+        <p:nvSpPr>
+          <p:cNvPr id="2" name="Title 1">
+            <a:extLst>
+              <a:ext uri="{FF2B5EF4-FFF2-40B4-BE49-F238E27FC236}">
+                <a16:creationId xmlns:a16="http://schemas.microsoft.com/office/drawing/2014/main" id="{8289E998-A4C8-4AA3-9B17-57925444A94D}"/>
+              </a:ext>
+            </a:extLst>
+          </p:cNvPr>
+          <p:cNvSpPr>
+            <a:spLocks noGrp="1"/>
+          </p:cNvSpPr>
+          <p:nvPr>
+            <p:ph type="title"/>
+          </p:nvPr>
+        </p:nvSpPr>
+        <p:spPr/>
+        <p:txBody>
+          <a:bodyPr/>
+          <a:lstStyle/>
+          <a:p>
+            <a:r>
+              <a:rPr lang="en-US" dirty="0" err="1"/>
+              <a:t>PowerClient</a:t>
+            </a:r>
+            <a:r>
+              <a:rPr lang="en-US" dirty="0"/>
+              <a:t> - policy</a:t>
+            </a:r>
+          </a:p>
+        </p:txBody>
+      </p:sp>
+      <p:sp>
+        <p:nvSpPr>
+          <p:cNvPr id="4" name="TextBox 3">
+            <a:extLst>
+              <a:ext uri="{FF2B5EF4-FFF2-40B4-BE49-F238E27FC236}">
+                <a16:creationId xmlns:a16="http://schemas.microsoft.com/office/drawing/2014/main" id="{25296D59-56A8-40F5-A1AA-36327202F5D8}"/>
+              </a:ext>
+            </a:extLst>
+          </p:cNvPr>
+          <p:cNvSpPr txBox="1"/>
+          <p:nvPr/>
+        </p:nvSpPr>
+        <p:spPr>
+          <a:xfrm>
+            <a:off x="838200" y="1625722"/>
+            <a:ext cx="10113819" cy="369332"/>
+          </a:xfrm>
+          <a:prstGeom prst="rect">
+            <a:avLst/>
+          </a:prstGeom>
+          <a:noFill/>
+        </p:spPr>
+        <p:txBody>
+          <a:bodyPr wrap="square" rtlCol="0">
+            <a:spAutoFit/>
+          </a:bodyPr>
+          <a:lstStyle/>
+          <a:p>
+            <a:r>
+              <a:rPr lang="en-US" i="1" dirty="0"/>
+              <a:t>Power = </a:t>
+            </a:r>
+            <a:r>
+              <a:rPr lang="en-US" i="1" dirty="0" err="1"/>
+              <a:t>outstanding_packets</a:t>
+            </a:r>
+            <a:r>
+              <a:rPr lang="en-US" i="1" dirty="0"/>
+              <a:t> / rtt^2</a:t>
+            </a:r>
+          </a:p>
+        </p:txBody>
+      </p:sp>
+      <p:sp>
+        <p:nvSpPr>
+          <p:cNvPr id="5" name="TextBox 4">
+            <a:extLst>
+              <a:ext uri="{FF2B5EF4-FFF2-40B4-BE49-F238E27FC236}">
+                <a16:creationId xmlns:a16="http://schemas.microsoft.com/office/drawing/2014/main" id="{CEB5AF2A-273B-4159-A4CE-53BE531A8E43}"/>
+              </a:ext>
+            </a:extLst>
+          </p:cNvPr>
+          <p:cNvSpPr txBox="1"/>
+          <p:nvPr/>
+        </p:nvSpPr>
+        <p:spPr>
+          <a:xfrm>
+            <a:off x="942109" y="2336800"/>
+            <a:ext cx="9476509" cy="3139321"/>
+          </a:xfrm>
+          <a:prstGeom prst="rect">
+            <a:avLst/>
+          </a:prstGeom>
+          <a:noFill/>
+        </p:spPr>
+        <p:txBody>
+          <a:bodyPr wrap="square" rtlCol="0">
+            <a:spAutoFit/>
+          </a:bodyPr>
+          <a:lstStyle/>
+          <a:p>
+            <a:r>
+              <a:rPr lang="en-US" dirty="0"/>
+              <a:t>If power 2rtt before is less than current power (increase):</a:t>
+            </a:r>
+          </a:p>
+          <a:p>
+            <a:r>
+              <a:rPr lang="en-US" dirty="0"/>
+              <a:t>     if exploit:</a:t>
+            </a:r>
+          </a:p>
+          <a:p>
+            <a:r>
+              <a:rPr lang="en-US" dirty="0"/>
+              <a:t>	increase </a:t>
+            </a:r>
+            <a:r>
+              <a:rPr lang="en-US" dirty="0" err="1"/>
+              <a:t>max_</a:t>
+            </a:r>
+            <a:r>
+              <a:rPr lang="en-US" i="1" dirty="0" err="1"/>
+              <a:t>outstanding_packets</a:t>
+            </a:r>
+            <a:r>
+              <a:rPr lang="en-US" i="1" dirty="0"/>
+              <a:t> by 20% </a:t>
+            </a:r>
+          </a:p>
+          <a:p>
+            <a:r>
+              <a:rPr lang="en-US" i="1" dirty="0"/>
+              <a:t>	return</a:t>
+            </a:r>
+          </a:p>
+          <a:p>
+            <a:r>
+              <a:rPr lang="en-US" i="1" dirty="0"/>
+              <a:t>Decrease </a:t>
+            </a:r>
+            <a:r>
+              <a:rPr lang="en-US" dirty="0" err="1"/>
+              <a:t>max_</a:t>
+            </a:r>
+            <a:r>
+              <a:rPr lang="en-US" i="1" dirty="0" err="1"/>
+              <a:t>outstanding_packets</a:t>
+            </a:r>
+            <a:r>
+              <a:rPr lang="en-US" i="1" dirty="0"/>
+              <a:t> by 20% </a:t>
+            </a:r>
+          </a:p>
+          <a:p>
+            <a:r>
+              <a:rPr lang="en-US" i="1" dirty="0"/>
+              <a:t>If </a:t>
+            </a:r>
+            <a:r>
+              <a:rPr lang="en-US" dirty="0" err="1"/>
+              <a:t>max_</a:t>
+            </a:r>
+            <a:r>
+              <a:rPr lang="en-US" i="1" dirty="0" err="1"/>
+              <a:t>outstanding_packets</a:t>
+            </a:r>
+            <a:r>
+              <a:rPr lang="en-US" i="1" dirty="0"/>
+              <a:t> &lt; </a:t>
+            </a:r>
+            <a:r>
+              <a:rPr lang="en-US" i="1" dirty="0" err="1"/>
+              <a:t>minimum_threshold</a:t>
+            </a:r>
+            <a:r>
+              <a:rPr lang="en-US" i="1" dirty="0"/>
+              <a:t>:</a:t>
+            </a:r>
+          </a:p>
+          <a:p>
+            <a:r>
+              <a:rPr lang="en-US" i="1" dirty="0"/>
+              <a:t>     </a:t>
+            </a:r>
+            <a:r>
+              <a:rPr lang="en-US" dirty="0" err="1"/>
+              <a:t>max_</a:t>
+            </a:r>
+            <a:r>
+              <a:rPr lang="en-US" i="1" dirty="0" err="1"/>
+              <a:t>outstanding_packets</a:t>
+            </a:r>
+            <a:r>
+              <a:rPr lang="en-US" i="1" dirty="0"/>
+              <a:t> = </a:t>
+            </a:r>
+            <a:r>
+              <a:rPr lang="en-US" i="1" dirty="0" err="1"/>
+              <a:t>minimum_threshold</a:t>
+            </a:r>
+            <a:endParaRPr lang="en-US" i="1" dirty="0"/>
+          </a:p>
+          <a:p>
+            <a:endParaRPr lang="en-US" i="1" dirty="0"/>
+          </a:p>
+          <a:p>
+            <a:r>
+              <a:rPr lang="en-US" i="1"/>
+              <a:t>return</a:t>
+            </a:r>
+            <a:endParaRPr lang="en-US" i="1" dirty="0"/>
+          </a:p>
+          <a:p>
+            <a:endParaRPr lang="en-US" i="1" dirty="0"/>
+          </a:p>
+          <a:p>
+            <a:endParaRPr lang="en-US" dirty="0"/>
+          </a:p>
+        </p:txBody>
+      </p:sp>
+    </p:spTree>
+    <p:extLst>
+      <p:ext uri="{BB962C8B-B14F-4D97-AF65-F5344CB8AC3E}">
+        <p14:creationId xmlns:p14="http://schemas.microsoft.com/office/powerpoint/2010/main" val="558530867"/>
       </p:ext>
     </p:extLst>
   </p:cSld>

</xml_diff>